<commit_message>
[DOC] rework according to comments on issue #22 and #26
</commit_message>
<xml_diff>
--- a/zigbee/EmberZnet and WSTK.pptx
+++ b/zigbee/EmberZnet and WSTK.pptx
@@ -5,7 +5,7 @@
     <p:sldMasterId id="2147484033" r:id="rId4"/>
   </p:sldMasterIdLst>
   <p:notesMasterIdLst>
-    <p:notesMasterId r:id="rId36"/>
+    <p:notesMasterId r:id="rId37"/>
   </p:notesMasterIdLst>
   <p:sldIdLst>
     <p:sldId id="257" r:id="rId5"/>
@@ -33,12 +33,13 @@
     <p:sldId id="936" r:id="rId27"/>
     <p:sldId id="957" r:id="rId28"/>
     <p:sldId id="934" r:id="rId29"/>
-    <p:sldId id="960" r:id="rId30"/>
-    <p:sldId id="943" r:id="rId31"/>
-    <p:sldId id="958" r:id="rId32"/>
-    <p:sldId id="939" r:id="rId33"/>
-    <p:sldId id="959" r:id="rId34"/>
-    <p:sldId id="284" r:id="rId35"/>
+    <p:sldId id="961" r:id="rId30"/>
+    <p:sldId id="960" r:id="rId31"/>
+    <p:sldId id="943" r:id="rId32"/>
+    <p:sldId id="958" r:id="rId33"/>
+    <p:sldId id="939" r:id="rId34"/>
+    <p:sldId id="959" r:id="rId35"/>
+    <p:sldId id="284" r:id="rId36"/>
   </p:sldIdLst>
   <p:sldSz cx="12192000" cy="6858000"/>
   <p:notesSz cx="7010400" cy="9296400"/>
@@ -165,20 +166,6 @@
 </p:cmAuthorLst>
 </file>
 
-<file path=ppt/comments/comment1.xml><?xml version="1.0" encoding="utf-8"?>
-<p:cmLst xmlns:a="http://schemas.openxmlformats.org/drawingml/2006/main" xmlns:r="http://schemas.openxmlformats.org/officeDocument/2006/relationships" xmlns:p="http://schemas.openxmlformats.org/presentationml/2006/main">
-  <p:cm authorId="2" dt="2019-11-05T16:05:00.751" idx="1">
-    <p:pos x="10" y="10"/>
-    <p:text>Add pictures here</p:text>
-    <p:extLst>
-      <p:ext uri="{C676402C-5697-4E1C-873F-D02D1690AC5C}">
-        <p15:threadingInfo xmlns:p15="http://schemas.microsoft.com/office/powerpoint/2012/main" timeZoneBias="-480"/>
-      </p:ext>
-    </p:extLst>
-  </p:cm>
-</p:cmLst>
-</file>
-
 <file path=ppt/notesMasters/notesMaster1.xml><?xml version="1.0" encoding="utf-8"?>
 <p:notesMaster xmlns:a="http://schemas.openxmlformats.org/drawingml/2006/main" xmlns:r="http://schemas.openxmlformats.org/officeDocument/2006/relationships" xmlns:p="http://schemas.openxmlformats.org/presentationml/2006/main">
   <p:cSld>
@@ -261,7 +248,7 @@
           <a:p>
             <a:fld id="{3CAB3C29-341D-6743-A203-2F7086D57830}" type="datetimeFigureOut">
               <a:rPr lang="en-US" smtClean="0"/>
-              <a:t>2019-11-08</a:t>
+              <a:t>2019-11-25</a:t>
             </a:fld>
             <a:endParaRPr lang="en-US"/>
           </a:p>
@@ -2201,37 +2188,6 @@
           <a:bodyPr/>
           <a:lstStyle/>
           <a:p>
-            <a:r>
-              <a:rPr lang="en-US" dirty="0"/>
-              <a:t>Silicon Labs has a great development platform based on the Wireless STK and radio boards.  The</a:t>
-            </a:r>
-            <a:r>
-              <a:rPr lang="en-US" baseline="0" dirty="0"/>
-              <a:t> Wireless STK provides the starting point for development providing the hardware and access to mesh software.  </a:t>
-            </a:r>
-          </a:p>
-          <a:p>
-            <a:endParaRPr lang="en-US" baseline="0" dirty="0"/>
-          </a:p>
-          <a:p>
-            <a:r>
-              <a:rPr lang="en-US" baseline="0" dirty="0"/>
-              <a:t>Different radio boards for both </a:t>
-            </a:r>
-            <a:r>
-              <a:rPr lang="en-US" baseline="0" dirty="0" err="1"/>
-              <a:t>SoCs</a:t>
-            </a:r>
-            <a:r>
-              <a:rPr lang="en-US" baseline="0" dirty="0"/>
-              <a:t> and modules plug into the WSTK main boards, providing a unified development platform from both the hardware and software perspective.</a:t>
-            </a:r>
-            <a:endParaRPr lang="en-US" dirty="0"/>
-          </a:p>
-          <a:p>
-            <a:endParaRPr lang="en-US" dirty="0"/>
-          </a:p>
-          <a:p>
             <a:endParaRPr lang="en-US" dirty="0"/>
           </a:p>
         </p:txBody>
@@ -2406,6 +2362,12 @@
           <a:bodyPr/>
           <a:lstStyle/>
           <a:p>
+            <a:r>
+              <a:rPr lang="en-US" dirty="0"/>
+              <a:t>Show the generated files.</a:t>
+            </a:r>
+          </a:p>
+          <a:p>
             <a:endParaRPr lang="en-US" dirty="0"/>
           </a:p>
         </p:txBody>
@@ -2436,7 +2398,7 @@
     </p:spTree>
     <p:extLst>
       <p:ext uri="{BB962C8B-B14F-4D97-AF65-F5344CB8AC3E}">
-        <p14:creationId xmlns:p14="http://schemas.microsoft.com/office/powerpoint/2010/main" val="932156101"/>
+        <p14:creationId xmlns:p14="http://schemas.microsoft.com/office/powerpoint/2010/main" val="3527585072"/>
       </p:ext>
     </p:extLst>
   </p:cSld>
@@ -2520,7 +2482,7 @@
     </p:spTree>
     <p:extLst>
       <p:ext uri="{BB962C8B-B14F-4D97-AF65-F5344CB8AC3E}">
-        <p14:creationId xmlns:p14="http://schemas.microsoft.com/office/powerpoint/2010/main" val="1177770956"/>
+        <p14:creationId xmlns:p14="http://schemas.microsoft.com/office/powerpoint/2010/main" val="932156101"/>
       </p:ext>
     </p:extLst>
   </p:cSld>
@@ -2604,7 +2566,7 @@
     </p:spTree>
     <p:extLst>
       <p:ext uri="{BB962C8B-B14F-4D97-AF65-F5344CB8AC3E}">
-        <p14:creationId xmlns:p14="http://schemas.microsoft.com/office/powerpoint/2010/main" val="1966343220"/>
+        <p14:creationId xmlns:p14="http://schemas.microsoft.com/office/powerpoint/2010/main" val="1177770956"/>
       </p:ext>
     </p:extLst>
   </p:cSld>
@@ -2688,7 +2650,7 @@
     </p:spTree>
     <p:extLst>
       <p:ext uri="{BB962C8B-B14F-4D97-AF65-F5344CB8AC3E}">
-        <p14:creationId xmlns:p14="http://schemas.microsoft.com/office/powerpoint/2010/main" val="1141249835"/>
+        <p14:creationId xmlns:p14="http://schemas.microsoft.com/office/powerpoint/2010/main" val="1966343220"/>
       </p:ext>
     </p:extLst>
   </p:cSld>
@@ -2874,7 +2836,7 @@
     </p:spTree>
     <p:extLst>
       <p:ext uri="{BB962C8B-B14F-4D97-AF65-F5344CB8AC3E}">
-        <p14:creationId xmlns:p14="http://schemas.microsoft.com/office/powerpoint/2010/main" val="3359557430"/>
+        <p14:creationId xmlns:p14="http://schemas.microsoft.com/office/powerpoint/2010/main" val="1141249835"/>
       </p:ext>
     </p:extLst>
   </p:cSld>
@@ -2950,6 +2912,90 @@
             <a:fld id="{D81990A0-AC65-4980-BF02-6ACC1434AAED}" type="slidenum">
               <a:rPr lang="en-US" smtClean="0"/>
               <a:t>31</a:t>
+            </a:fld>
+            <a:endParaRPr lang="en-US"/>
+          </a:p>
+        </p:txBody>
+      </p:sp>
+    </p:spTree>
+    <p:extLst>
+      <p:ext uri="{BB962C8B-B14F-4D97-AF65-F5344CB8AC3E}">
+        <p14:creationId xmlns:p14="http://schemas.microsoft.com/office/powerpoint/2010/main" val="3359557430"/>
+      </p:ext>
+    </p:extLst>
+  </p:cSld>
+  <p:clrMapOvr>
+    <a:masterClrMapping/>
+  </p:clrMapOvr>
+</p:notes>
+</file>
+
+<file path=ppt/notesSlides/notesSlide32.xml><?xml version="1.0" encoding="utf-8"?>
+<p:notes xmlns:a="http://schemas.openxmlformats.org/drawingml/2006/main" xmlns:r="http://schemas.openxmlformats.org/officeDocument/2006/relationships" xmlns:p="http://schemas.openxmlformats.org/presentationml/2006/main">
+  <p:cSld>
+    <p:spTree>
+      <p:nvGrpSpPr>
+        <p:cNvPr id="1" name=""/>
+        <p:cNvGrpSpPr/>
+        <p:nvPr/>
+      </p:nvGrpSpPr>
+      <p:grpSpPr>
+        <a:xfrm>
+          <a:off x="0" y="0"/>
+          <a:ext cx="0" cy="0"/>
+          <a:chOff x="0" y="0"/>
+          <a:chExt cx="0" cy="0"/>
+        </a:xfrm>
+      </p:grpSpPr>
+      <p:sp>
+        <p:nvSpPr>
+          <p:cNvPr id="2" name="Slide Image Placeholder 1"/>
+          <p:cNvSpPr>
+            <a:spLocks noGrp="1" noRot="1" noChangeAspect="1"/>
+          </p:cNvSpPr>
+          <p:nvPr>
+            <p:ph type="sldImg"/>
+          </p:nvPr>
+        </p:nvSpPr>
+        <p:spPr/>
+      </p:sp>
+      <p:sp>
+        <p:nvSpPr>
+          <p:cNvPr id="3" name="Notes Placeholder 2"/>
+          <p:cNvSpPr>
+            <a:spLocks noGrp="1"/>
+          </p:cNvSpPr>
+          <p:nvPr>
+            <p:ph type="body" idx="1"/>
+          </p:nvPr>
+        </p:nvSpPr>
+        <p:spPr/>
+        <p:txBody>
+          <a:bodyPr/>
+          <a:lstStyle/>
+          <a:p>
+            <a:endParaRPr lang="en-US" dirty="0"/>
+          </a:p>
+        </p:txBody>
+      </p:sp>
+      <p:sp>
+        <p:nvSpPr>
+          <p:cNvPr id="4" name="Slide Number Placeholder 3"/>
+          <p:cNvSpPr>
+            <a:spLocks noGrp="1"/>
+          </p:cNvSpPr>
+          <p:nvPr>
+            <p:ph type="sldNum" sz="quarter" idx="10"/>
+          </p:nvPr>
+        </p:nvSpPr>
+        <p:spPr/>
+        <p:txBody>
+          <a:bodyPr/>
+          <a:lstStyle/>
+          <a:p>
+            <a:fld id="{D81990A0-AC65-4980-BF02-6ACC1434AAED}" type="slidenum">
+              <a:rPr lang="en-US" smtClean="0"/>
+              <a:t>32</a:t>
             </a:fld>
             <a:endParaRPr lang="en-US"/>
           </a:p>
@@ -19233,7 +19279,7 @@
           <a:p>
             <a:r>
               <a:rPr lang="en-US" dirty="0"/>
-              <a:t>2019 Jim Lin</a:t>
+              <a:t>2019</a:t>
             </a:r>
           </a:p>
         </p:txBody>
@@ -20715,78 +20761,126 @@
           </a:p>
         </p:txBody>
       </p:sp>
-      <p:sp>
-        <p:nvSpPr>
-          <p:cNvPr id="15" name="Text Placeholder 2">
+      <p:pic>
+        <p:nvPicPr>
+          <p:cNvPr id="2" name="Picture 1">
             <a:extLst>
               <a:ext uri="{FF2B5EF4-FFF2-40B4-BE49-F238E27FC236}">
-                <a16:creationId xmlns:a16="http://schemas.microsoft.com/office/drawing/2014/main" id="{68B6F77B-DCE8-4F5A-99DF-7C0A7A6B19F4}"/>
+                <a16:creationId xmlns:a16="http://schemas.microsoft.com/office/drawing/2014/main" id="{32F4DE3E-F231-484F-BD29-8B879D3A2604}"/>
               </a:ext>
             </a:extLst>
           </p:cNvPr>
-          <p:cNvSpPr>
-            <a:spLocks noGrp="1"/>
-          </p:cNvSpPr>
-          <p:nvPr>
-            <p:ph idx="10"/>
-          </p:nvPr>
-        </p:nvSpPr>
+          <p:cNvPicPr>
+            <a:picLocks noChangeAspect="1"/>
+          </p:cNvPicPr>
+          <p:nvPr/>
+        </p:nvPicPr>
+        <p:blipFill>
+          <a:blip r:embed="rId3"/>
+          <a:stretch>
+            <a:fillRect/>
+          </a:stretch>
+        </p:blipFill>
         <p:spPr>
           <a:xfrm>
-            <a:off x="679450" y="1143000"/>
-            <a:ext cx="10820400" cy="5029200"/>
+            <a:off x="4876126" y="1191419"/>
+            <a:ext cx="4210050" cy="1171575"/>
           </a:xfrm>
+          <a:prstGeom prst="rect">
+            <a:avLst/>
+          </a:prstGeom>
         </p:spPr>
-        <p:txBody>
-          <a:bodyPr/>
-          <a:lstStyle/>
-          <a:p>
-            <a:r>
-              <a:rPr lang="en-US" dirty="0"/>
-              <a:t>Simplicity Studio IDE</a:t>
-            </a:r>
-          </a:p>
-          <a:p>
-            <a:pPr lvl="1"/>
-            <a:r>
-              <a:rPr lang="en-US" dirty="0" err="1"/>
-              <a:t>AppBuilder</a:t>
-            </a:r>
-            <a:endParaRPr lang="en-US" dirty="0"/>
-          </a:p>
-          <a:p>
-            <a:pPr lvl="1"/>
-            <a:r>
-              <a:rPr lang="en-US" dirty="0"/>
-              <a:t>Hardware Configurator</a:t>
-            </a:r>
-          </a:p>
-          <a:p>
-            <a:pPr lvl="1"/>
-            <a:r>
-              <a:rPr lang="en-US" dirty="0"/>
-              <a:t>Network Analyzer</a:t>
-            </a:r>
-          </a:p>
-          <a:p>
-            <a:pPr lvl="1"/>
-            <a:r>
-              <a:rPr lang="en-US" dirty="0"/>
-              <a:t>Energy Profiler</a:t>
-            </a:r>
-          </a:p>
-          <a:p>
-            <a:pPr lvl="1"/>
-            <a:r>
-              <a:rPr lang="en-US" dirty="0"/>
-              <a:t>Simplicity Commander</a:t>
-            </a:r>
-          </a:p>
-          <a:p>
-            <a:endParaRPr lang="en-US" dirty="0"/>
-          </a:p>
-        </p:txBody>
-      </p:sp>
+      </p:pic>
+      <p:pic>
+        <p:nvPicPr>
+          <p:cNvPr id="4" name="Picture 3">
+            <a:extLst>
+              <a:ext uri="{FF2B5EF4-FFF2-40B4-BE49-F238E27FC236}">
+                <a16:creationId xmlns:a16="http://schemas.microsoft.com/office/drawing/2014/main" id="{D2E63295-6546-4B95-B237-BAFF42C8D21A}"/>
+              </a:ext>
+            </a:extLst>
+          </p:cNvPr>
+          <p:cNvPicPr>
+            <a:picLocks noChangeAspect="1"/>
+          </p:cNvPicPr>
+          <p:nvPr/>
+        </p:nvPicPr>
+        <p:blipFill>
+          <a:blip r:embed="rId4"/>
+          <a:stretch>
+            <a:fillRect/>
+          </a:stretch>
+        </p:blipFill>
+        <p:spPr>
+          <a:xfrm>
+            <a:off x="4876126" y="2640013"/>
+            <a:ext cx="5133975" cy="1619250"/>
+          </a:xfrm>
+          <a:prstGeom prst="rect">
+            <a:avLst/>
+          </a:prstGeom>
+        </p:spPr>
+      </p:pic>
+      <p:pic>
+        <p:nvPicPr>
+          <p:cNvPr id="7" name="Picture 6">
+            <a:extLst>
+              <a:ext uri="{FF2B5EF4-FFF2-40B4-BE49-F238E27FC236}">
+                <a16:creationId xmlns:a16="http://schemas.microsoft.com/office/drawing/2014/main" id="{F7429A17-9633-4CAB-8F82-7DF34AEBE6B8}"/>
+              </a:ext>
+            </a:extLst>
+          </p:cNvPr>
+          <p:cNvPicPr>
+            <a:picLocks noChangeAspect="1"/>
+          </p:cNvPicPr>
+          <p:nvPr/>
+        </p:nvPicPr>
+        <p:blipFill>
+          <a:blip r:embed="rId5"/>
+          <a:stretch>
+            <a:fillRect/>
+          </a:stretch>
+        </p:blipFill>
+        <p:spPr>
+          <a:xfrm>
+            <a:off x="4876126" y="4259263"/>
+            <a:ext cx="3933825" cy="1123950"/>
+          </a:xfrm>
+          <a:prstGeom prst="rect">
+            <a:avLst/>
+          </a:prstGeom>
+        </p:spPr>
+      </p:pic>
+      <p:pic>
+        <p:nvPicPr>
+          <p:cNvPr id="8" name="Picture 7">
+            <a:extLst>
+              <a:ext uri="{FF2B5EF4-FFF2-40B4-BE49-F238E27FC236}">
+                <a16:creationId xmlns:a16="http://schemas.microsoft.com/office/drawing/2014/main" id="{25C9CA43-8AFB-42D0-94D7-A5C4CA1D6F1C}"/>
+              </a:ext>
+            </a:extLst>
+          </p:cNvPr>
+          <p:cNvPicPr>
+            <a:picLocks noChangeAspect="1"/>
+          </p:cNvPicPr>
+          <p:nvPr/>
+        </p:nvPicPr>
+        <p:blipFill>
+          <a:blip r:embed="rId6"/>
+          <a:stretch>
+            <a:fillRect/>
+          </a:stretch>
+        </p:blipFill>
+        <p:spPr>
+          <a:xfrm>
+            <a:off x="761326" y="2836862"/>
+            <a:ext cx="3690024" cy="1533525"/>
+          </a:xfrm>
+          <a:prstGeom prst="rect">
+            <a:avLst/>
+          </a:prstGeom>
+        </p:spPr>
+      </p:pic>
     </p:spTree>
     <p:extLst>
       <p:ext uri="{BB962C8B-B14F-4D97-AF65-F5344CB8AC3E}">
@@ -24937,6 +25031,91 @@
           <a:p>
             <a:r>
               <a:rPr lang="en-US" dirty="0"/>
+              <a:t>Hardware Configurator</a:t>
+            </a:r>
+          </a:p>
+        </p:txBody>
+      </p:sp>
+      <p:pic>
+        <p:nvPicPr>
+          <p:cNvPr id="4" name="Picture 3">
+            <a:extLst>
+              <a:ext uri="{FF2B5EF4-FFF2-40B4-BE49-F238E27FC236}">
+                <a16:creationId xmlns:a16="http://schemas.microsoft.com/office/drawing/2014/main" id="{46A94657-BCC5-4AD3-BA8B-4DE3FF9F7E30}"/>
+              </a:ext>
+            </a:extLst>
+          </p:cNvPr>
+          <p:cNvPicPr>
+            <a:picLocks noChangeAspect="1"/>
+          </p:cNvPicPr>
+          <p:nvPr/>
+        </p:nvPicPr>
+        <p:blipFill>
+          <a:blip r:embed="rId3"/>
+          <a:stretch>
+            <a:fillRect/>
+          </a:stretch>
+        </p:blipFill>
+        <p:spPr>
+          <a:xfrm>
+            <a:off x="1004887" y="1045803"/>
+            <a:ext cx="10182225" cy="5183399"/>
+          </a:xfrm>
+          <a:prstGeom prst="rect">
+            <a:avLst/>
+          </a:prstGeom>
+        </p:spPr>
+      </p:pic>
+    </p:spTree>
+    <p:extLst>
+      <p:ext uri="{BB962C8B-B14F-4D97-AF65-F5344CB8AC3E}">
+        <p14:creationId xmlns:p14="http://schemas.microsoft.com/office/powerpoint/2010/main" val="3885242857"/>
+      </p:ext>
+    </p:extLst>
+  </p:cSld>
+  <p:clrMapOvr>
+    <a:masterClrMapping/>
+  </p:clrMapOvr>
+  <p:transition spd="med">
+    <p:wipe/>
+  </p:transition>
+</p:sld>
+</file>
+
+<file path=ppt/slides/slide27.xml><?xml version="1.0" encoding="utf-8"?>
+<p:sld xmlns:a="http://schemas.openxmlformats.org/drawingml/2006/main" xmlns:r="http://schemas.openxmlformats.org/officeDocument/2006/relationships" xmlns:p="http://schemas.openxmlformats.org/presentationml/2006/main">
+  <p:cSld>
+    <p:spTree>
+      <p:nvGrpSpPr>
+        <p:cNvPr id="1" name=""/>
+        <p:cNvGrpSpPr/>
+        <p:nvPr/>
+      </p:nvGrpSpPr>
+      <p:grpSpPr>
+        <a:xfrm>
+          <a:off x="0" y="0"/>
+          <a:ext cx="0" cy="0"/>
+          <a:chOff x="0" y="0"/>
+          <a:chExt cx="0" cy="0"/>
+        </a:xfrm>
+      </p:grpSpPr>
+      <p:sp>
+        <p:nvSpPr>
+          <p:cNvPr id="3" name="Title 2"/>
+          <p:cNvSpPr>
+            <a:spLocks noGrp="1"/>
+          </p:cNvSpPr>
+          <p:nvPr>
+            <p:ph type="title"/>
+          </p:nvPr>
+        </p:nvSpPr>
+        <p:spPr/>
+        <p:txBody>
+          <a:bodyPr/>
+          <a:lstStyle/>
+          <a:p>
+            <a:r>
+              <a:rPr lang="en-US" dirty="0"/>
               <a:t>Flash/Program</a:t>
             </a:r>
           </a:p>
@@ -25132,212 +25311,6 @@
 </p:sld>
 </file>
 
-<file path=ppt/slides/slide27.xml><?xml version="1.0" encoding="utf-8"?>
-<p:sld xmlns:a="http://schemas.openxmlformats.org/drawingml/2006/main" xmlns:r="http://schemas.openxmlformats.org/officeDocument/2006/relationships" xmlns:p="http://schemas.openxmlformats.org/presentationml/2006/main">
-  <p:cSld>
-    <p:spTree>
-      <p:nvGrpSpPr>
-        <p:cNvPr id="1" name=""/>
-        <p:cNvGrpSpPr/>
-        <p:nvPr/>
-      </p:nvGrpSpPr>
-      <p:grpSpPr>
-        <a:xfrm>
-          <a:off x="0" y="0"/>
-          <a:ext cx="0" cy="0"/>
-          <a:chOff x="0" y="0"/>
-          <a:chExt cx="0" cy="0"/>
-        </a:xfrm>
-      </p:grpSpPr>
-      <p:sp>
-        <p:nvSpPr>
-          <p:cNvPr id="3" name="Title 2"/>
-          <p:cNvSpPr>
-            <a:spLocks noGrp="1"/>
-          </p:cNvSpPr>
-          <p:nvPr>
-            <p:ph type="title"/>
-          </p:nvPr>
-        </p:nvSpPr>
-        <p:spPr/>
-        <p:txBody>
-          <a:bodyPr/>
-          <a:lstStyle/>
-          <a:p>
-            <a:r>
-              <a:rPr lang="en-US" dirty="0"/>
-              <a:t>Commands</a:t>
-            </a:r>
-          </a:p>
-        </p:txBody>
-      </p:sp>
-      <p:sp>
-        <p:nvSpPr>
-          <p:cNvPr id="5" name="Content Placeholder 4">
-            <a:extLst>
-              <a:ext uri="{FF2B5EF4-FFF2-40B4-BE49-F238E27FC236}">
-                <a16:creationId xmlns:a16="http://schemas.microsoft.com/office/drawing/2014/main" id="{76CEF9E2-781A-4501-9447-AE0C0C250B03}"/>
-              </a:ext>
-            </a:extLst>
-          </p:cNvPr>
-          <p:cNvSpPr>
-            <a:spLocks noGrp="1"/>
-          </p:cNvSpPr>
-          <p:nvPr>
-            <p:ph idx="10"/>
-          </p:nvPr>
-        </p:nvSpPr>
-        <p:spPr/>
-        <p:txBody>
-          <a:bodyPr/>
-          <a:lstStyle/>
-          <a:p>
-            <a:r>
-              <a:rPr lang="en-US" b="1" dirty="0"/>
-              <a:t>plugin network-creator form [useCentralizedSecurity:1] [panId:2] [radioTxPower:1] [channel:1]</a:t>
-            </a:r>
-            <a:endParaRPr lang="en-US" dirty="0"/>
-          </a:p>
-          <a:p>
-            <a:pPr lvl="1"/>
-            <a:r>
-              <a:rPr lang="en-US" i="1" dirty="0"/>
-              <a:t>Form a network with specified parameters.</a:t>
-            </a:r>
-            <a:endParaRPr lang="en-US" dirty="0"/>
-          </a:p>
-          <a:p>
-            <a:pPr lvl="2"/>
-            <a:r>
-              <a:rPr lang="en-US" dirty="0" err="1"/>
-              <a:t>useCentralizedSecurity</a:t>
-            </a:r>
-            <a:r>
-              <a:rPr lang="en-US" dirty="0"/>
-              <a:t> - BOOLEAN - Whether or not to form a centralized network. If this value is false, the device will attempt to join a distributed network.</a:t>
-            </a:r>
-          </a:p>
-          <a:p>
-            <a:pPr lvl="2"/>
-            <a:r>
-              <a:rPr lang="en-US" dirty="0" err="1"/>
-              <a:t>panId</a:t>
-            </a:r>
-            <a:r>
-              <a:rPr lang="en-US" dirty="0"/>
-              <a:t> - INT16U - </a:t>
-            </a:r>
-            <a:r>
-              <a:rPr lang="en-US" dirty="0" err="1"/>
-              <a:t>PanID</a:t>
-            </a:r>
-            <a:r>
-              <a:rPr lang="en-US" dirty="0"/>
-              <a:t> of the network to be formed</a:t>
-            </a:r>
-          </a:p>
-          <a:p>
-            <a:pPr lvl="2"/>
-            <a:r>
-              <a:rPr lang="en-US" dirty="0" err="1"/>
-              <a:t>radioTxPower</a:t>
-            </a:r>
-            <a:r>
-              <a:rPr lang="en-US" dirty="0"/>
-              <a:t> - INT8S - Tx power of the network to be formed</a:t>
-            </a:r>
-          </a:p>
-          <a:p>
-            <a:pPr lvl="2"/>
-            <a:r>
-              <a:rPr lang="en-US" dirty="0"/>
-              <a:t>channel - INT8U - channel of the network to be formed</a:t>
-            </a:r>
-          </a:p>
-          <a:p>
-            <a:pPr lvl="2"/>
-            <a:endParaRPr lang="en-US" dirty="0"/>
-          </a:p>
-          <a:p>
-            <a:r>
-              <a:rPr lang="en-US" b="1" dirty="0"/>
-              <a:t>plugin network-creator-security open-network</a:t>
-            </a:r>
-            <a:endParaRPr lang="en-US" dirty="0"/>
-          </a:p>
-          <a:p>
-            <a:pPr lvl="1"/>
-            <a:r>
-              <a:rPr lang="en-US" i="1" dirty="0"/>
-              <a:t>Open the network for joining.</a:t>
-            </a:r>
-          </a:p>
-          <a:p>
-            <a:pPr lvl="1"/>
-            <a:endParaRPr lang="en-US" dirty="0"/>
-          </a:p>
-          <a:p>
-            <a:r>
-              <a:rPr lang="en-US" b="1" dirty="0"/>
-              <a:t>plugin network-creator-security open-with-key [eui64:8] [</a:t>
-            </a:r>
-            <a:r>
-              <a:rPr lang="en-US" b="1" dirty="0" err="1"/>
-              <a:t>joiningLinkKey</a:t>
-            </a:r>
-            <a:r>
-              <a:rPr lang="en-US" b="1" dirty="0"/>
-              <a:t>:-1]</a:t>
-            </a:r>
-            <a:endParaRPr lang="en-US" dirty="0"/>
-          </a:p>
-          <a:p>
-            <a:pPr lvl="1"/>
-            <a:r>
-              <a:rPr lang="en-US" i="1" dirty="0"/>
-              <a:t>Open the network that would only allow the node with specified EUI and link key pair to join.</a:t>
-            </a:r>
-            <a:endParaRPr lang="en-US" dirty="0"/>
-          </a:p>
-          <a:p>
-            <a:pPr lvl="2"/>
-            <a:r>
-              <a:rPr lang="en-US" dirty="0"/>
-              <a:t>eui64 - IEEE_ADDRESS - The EUI64 of the joining device.</a:t>
-            </a:r>
-          </a:p>
-          <a:p>
-            <a:pPr lvl="2"/>
-            <a:r>
-              <a:rPr lang="en-US" dirty="0" err="1"/>
-              <a:t>joiningLinkKey</a:t>
-            </a:r>
-            <a:r>
-              <a:rPr lang="en-US" dirty="0"/>
-              <a:t> - OCTET_STRING - The link key that the joining device will use to enter the network.</a:t>
-            </a:r>
-          </a:p>
-          <a:p>
-            <a:endParaRPr lang="en-US" dirty="0"/>
-          </a:p>
-        </p:txBody>
-      </p:sp>
-    </p:spTree>
-    <p:extLst>
-      <p:ext uri="{BB962C8B-B14F-4D97-AF65-F5344CB8AC3E}">
-        <p14:creationId xmlns:p14="http://schemas.microsoft.com/office/powerpoint/2010/main" val="4209547546"/>
-      </p:ext>
-    </p:extLst>
-  </p:cSld>
-  <p:clrMapOvr>
-    <a:masterClrMapping/>
-  </p:clrMapOvr>
-  <p:transition spd="med">
-    <p:wipe/>
-  </p:transition>
-</p:sld>
-</file>
-
 <file path=ppt/slides/slide28.xml><?xml version="1.0" encoding="utf-8"?>
 <p:sld xmlns:a="http://schemas.openxmlformats.org/drawingml/2006/main" xmlns:r="http://schemas.openxmlformats.org/officeDocument/2006/relationships" xmlns:p="http://schemas.openxmlformats.org/presentationml/2006/main">
   <p:cSld>
@@ -25372,7 +25345,7 @@
           <a:p>
             <a:r>
               <a:rPr lang="en-US" dirty="0"/>
-              <a:t>Commands</a:t>
+              <a:t>CLI Commands</a:t>
             </a:r>
           </a:p>
         </p:txBody>
@@ -25393,19 +25366,14 @@
             <p:ph idx="10"/>
           </p:nvPr>
         </p:nvSpPr>
-        <p:spPr>
-          <a:xfrm>
-            <a:off x="679450" y="1143000"/>
-            <a:ext cx="10820400" cy="5029200"/>
-          </a:xfrm>
-        </p:spPr>
+        <p:spPr/>
         <p:txBody>
           <a:bodyPr/>
           <a:lstStyle/>
           <a:p>
             <a:r>
               <a:rPr lang="en-US" b="1" dirty="0"/>
-              <a:t>plugin network-steering start [options:1]</a:t>
+              <a:t>plugin network-creator form [useCentralizedSecurity:1] [panId:2] [radioTxPower:1] [channel:1]</a:t>
             </a:r>
             <a:endParaRPr lang="en-US" dirty="0"/>
           </a:p>
@@ -25413,15 +25381,56 @@
             <a:pPr lvl="1"/>
             <a:r>
               <a:rPr lang="en-US" i="1" dirty="0"/>
-              <a:t>Starts the network steering process.</a:t>
+              <a:t>Form a network with specified parameters.</a:t>
             </a:r>
             <a:endParaRPr lang="en-US" dirty="0"/>
           </a:p>
           <a:p>
             <a:pPr lvl="2"/>
             <a:r>
+              <a:rPr lang="en-US" dirty="0" err="1"/>
+              <a:t>useCentralizedSecurity</a:t>
+            </a:r>
+            <a:r>
               <a:rPr lang="en-US" dirty="0"/>
-              <a:t>options - INT8U - A mask of options for indicating specific behavior within the network-steering process.</a:t>
+              <a:t> - BOOLEAN - Whether or not to form a centralized network. If this value is false, the device will attempt to join a distributed network.</a:t>
+            </a:r>
+          </a:p>
+          <a:p>
+            <a:pPr lvl="2"/>
+            <a:r>
+              <a:rPr lang="en-US" dirty="0" err="1"/>
+              <a:t>panId</a:t>
+            </a:r>
+            <a:r>
+              <a:rPr lang="en-US" dirty="0"/>
+              <a:t> - INT16U - </a:t>
+            </a:r>
+            <a:r>
+              <a:rPr lang="en-US" dirty="0" err="1"/>
+              <a:t>PanID</a:t>
+            </a:r>
+            <a:r>
+              <a:rPr lang="en-US" dirty="0"/>
+              <a:t> of the network to be formed</a:t>
+            </a:r>
+          </a:p>
+          <a:p>
+            <a:pPr lvl="2"/>
+            <a:r>
+              <a:rPr lang="en-US" dirty="0" err="1"/>
+              <a:t>radioTxPower</a:t>
+            </a:r>
+            <a:r>
+              <a:rPr lang="en-US" dirty="0"/>
+              <a:t> - INT8S - Tx power of the network to be formed</a:t>
+            </a:r>
+          </a:p>
+          <a:p>
+            <a:pPr lvl="2"/>
+            <a:r>
+              <a:rPr lang="en-US" dirty="0"/>
+              <a:t>channel - INT8U - channel of the network to be formed</a:t>
             </a:r>
           </a:p>
           <a:p>
@@ -25430,21 +25439,34 @@
           </a:p>
           <a:p>
             <a:r>
+              <a:rPr lang="en-US" b="1" dirty="0"/>
+              <a:t>plugin network-creator-security open-network</a:t>
+            </a:r>
+            <a:endParaRPr lang="en-US" dirty="0"/>
+          </a:p>
+          <a:p>
+            <a:pPr lvl="1"/>
+            <a:r>
+              <a:rPr lang="en-US" i="1" dirty="0"/>
+              <a:t>Open the network for joining.</a:t>
+            </a:r>
+          </a:p>
+          <a:p>
+            <a:pPr lvl="1"/>
+            <a:endParaRPr lang="en-US" dirty="0"/>
+          </a:p>
+          <a:p>
+            <a:r>
+              <a:rPr lang="en-US" b="1" dirty="0"/>
+              <a:t>plugin network-creator-security open-with-key [eui64:8] [</a:t>
+            </a:r>
+            <a:r>
               <a:rPr lang="en-US" b="1" dirty="0" err="1"/>
-              <a:t>zcl</a:t>
+              <a:t>joiningLinkKey</a:t>
             </a:r>
             <a:r>
               <a:rPr lang="en-US" b="1" dirty="0"/>
-              <a:t> on-off toggle</a:t>
-            </a:r>
-          </a:p>
-          <a:p>
-            <a:endParaRPr lang="en-US" b="1" dirty="0"/>
-          </a:p>
-          <a:p>
-            <a:r>
-              <a:rPr lang="en-US" b="1" dirty="0"/>
-              <a:t>send [id:2] [src-endpoint:1] [dst-endpoint:1]</a:t>
+              <a:t>:-1]</a:t>
             </a:r>
             <a:endParaRPr lang="en-US" dirty="0"/>
           </a:p>
@@ -25452,7 +25474,7 @@
             <a:pPr lvl="1"/>
             <a:r>
               <a:rPr lang="en-US" i="1" dirty="0"/>
-              <a:t>Send a pre-buffered message from a given endpoint to an endpoint on a device with a given short address.</a:t>
+              <a:t>Open the network that would only allow the node with specified EUI and link key pair to join.</a:t>
             </a:r>
             <a:endParaRPr lang="en-US" dirty="0"/>
           </a:p>
@@ -25460,29 +25482,18 @@
             <a:pPr lvl="2"/>
             <a:r>
               <a:rPr lang="en-US" dirty="0"/>
-              <a:t>id - INT16U - short id of the device to send the message to</a:t>
+              <a:t>eui64 - IEEE_ADDRESS - The EUI64 of the joining device.</a:t>
             </a:r>
           </a:p>
           <a:p>
             <a:pPr lvl="2"/>
             <a:r>
               <a:rPr lang="en-US" dirty="0" err="1"/>
-              <a:t>src</a:t>
+              <a:t>joiningLinkKey</a:t>
             </a:r>
             <a:r>
               <a:rPr lang="en-US" dirty="0"/>
-              <a:t>-endpoint - INT8U - The endpoint to send the message from</a:t>
-            </a:r>
-          </a:p>
-          <a:p>
-            <a:pPr lvl="2"/>
-            <a:r>
-              <a:rPr lang="en-US" dirty="0" err="1"/>
-              <a:t>dst</a:t>
-            </a:r>
-            <a:r>
-              <a:rPr lang="en-US" dirty="0"/>
-              <a:t>-endpoint - INT8U - The endpoint to send the message to</a:t>
+              <a:t> - OCTET_STRING - The link key that the joining device will use to enter the network.</a:t>
             </a:r>
           </a:p>
           <a:p>
@@ -25493,7 +25504,7 @@
     </p:spTree>
     <p:extLst>
       <p:ext uri="{BB962C8B-B14F-4D97-AF65-F5344CB8AC3E}">
-        <p14:creationId xmlns:p14="http://schemas.microsoft.com/office/powerpoint/2010/main" val="1366958089"/>
+        <p14:creationId xmlns:p14="http://schemas.microsoft.com/office/powerpoint/2010/main" val="4209547546"/>
       </p:ext>
     </p:extLst>
   </p:cSld>
@@ -25540,7 +25551,7 @@
           <a:p>
             <a:r>
               <a:rPr lang="en-US" dirty="0"/>
-              <a:t>Debug</a:t>
+              <a:t>CLI Commands</a:t>
             </a:r>
           </a:p>
         </p:txBody>
@@ -25561,84 +25572,99 @@
             <p:ph idx="10"/>
           </p:nvPr>
         </p:nvSpPr>
-        <p:spPr/>
+        <p:spPr>
+          <a:xfrm>
+            <a:off x="679450" y="1143000"/>
+            <a:ext cx="10820400" cy="5029200"/>
+          </a:xfrm>
+        </p:spPr>
         <p:txBody>
           <a:bodyPr/>
           <a:lstStyle/>
           <a:p>
             <a:r>
+              <a:rPr lang="en-US" b="1" dirty="0"/>
+              <a:t>plugin network-steering start [options:1]</a:t>
+            </a:r>
+            <a:endParaRPr lang="en-US" dirty="0"/>
+          </a:p>
+          <a:p>
+            <a:pPr lvl="1"/>
+            <a:r>
+              <a:rPr lang="en-US" i="1" dirty="0"/>
+              <a:t>Starts the network steering process.</a:t>
+            </a:r>
+            <a:endParaRPr lang="en-US" dirty="0"/>
+          </a:p>
+          <a:p>
+            <a:pPr lvl="2"/>
+            <a:r>
+              <a:rPr lang="en-US" dirty="0"/>
+              <a:t>options - INT8U - A mask of options for indicating specific behavior within the network-steering process.</a:t>
+            </a:r>
+          </a:p>
+          <a:p>
+            <a:pPr lvl="2"/>
+            <a:endParaRPr lang="en-US" dirty="0"/>
+          </a:p>
+          <a:p>
+            <a:r>
               <a:rPr lang="en-US" b="1" dirty="0" err="1"/>
-              <a:t>emberAfCorePrint</a:t>
+              <a:t>zcl</a:t>
             </a:r>
             <a:r>
               <a:rPr lang="en-US" b="1" dirty="0"/>
-              <a:t>(…) </a:t>
-            </a:r>
+              <a:t> on-off toggle</a:t>
+            </a:r>
+          </a:p>
+          <a:p>
+            <a:endParaRPr lang="en-US" b="1" dirty="0"/>
+          </a:p>
+          <a:p>
+            <a:r>
+              <a:rPr lang="en-US" b="1" dirty="0"/>
+              <a:t>send [id:2] [src-endpoint:1] [dst-endpoint:1]</a:t>
+            </a:r>
+            <a:endParaRPr lang="en-US" dirty="0"/>
+          </a:p>
+          <a:p>
+            <a:pPr lvl="1"/>
+            <a:r>
+              <a:rPr lang="en-US" i="1" dirty="0"/>
+              <a:t>Send a pre-buffered message from a given endpoint to an endpoint on a device with a given short address.</a:t>
+            </a:r>
+            <a:endParaRPr lang="en-US" dirty="0"/>
+          </a:p>
+          <a:p>
+            <a:pPr lvl="2"/>
             <a:r>
               <a:rPr lang="en-US" dirty="0"/>
-              <a:t>- prints a single line without a carriage return </a:t>
-            </a:r>
-          </a:p>
-          <a:p>
-            <a:r>
-              <a:rPr lang="en-US" b="1" dirty="0" err="1"/>
-              <a:t>emberAfCorePrintln</a:t>
-            </a:r>
-            <a:r>
-              <a:rPr lang="en-US" b="1" dirty="0"/>
-              <a:t>(…) </a:t>
+              <a:t>id - INT16U - short id of the device to send the message to</a:t>
+            </a:r>
+          </a:p>
+          <a:p>
+            <a:pPr lvl="2"/>
+            <a:r>
+              <a:rPr lang="en-US" dirty="0" err="1"/>
+              <a:t>src</a:t>
             </a:r>
             <a:r>
               <a:rPr lang="en-US" dirty="0"/>
-              <a:t>- prints a single line with a carriage return </a:t>
-            </a:r>
-          </a:p>
-          <a:p>
-            <a:r>
-              <a:rPr lang="en-US" b="1" dirty="0" err="1"/>
-              <a:t>emberAfCorePrintBuffer</a:t>
-            </a:r>
-            <a:r>
-              <a:rPr lang="en-US" b="1" dirty="0"/>
-              <a:t>( buffer, </a:t>
-            </a:r>
-            <a:r>
-              <a:rPr lang="en-US" b="1" dirty="0" err="1"/>
-              <a:t>len</a:t>
-            </a:r>
-            <a:r>
-              <a:rPr lang="en-US" b="1" dirty="0"/>
-              <a:t>, </a:t>
-            </a:r>
-            <a:r>
-              <a:rPr lang="en-US" b="1" dirty="0" err="1"/>
-              <a:t>withspace</a:t>
-            </a:r>
-            <a:r>
-              <a:rPr lang="en-US" b="1" dirty="0"/>
-              <a:t> ) </a:t>
+              <a:t>-endpoint - INT8U - The endpoint to send the message from</a:t>
+            </a:r>
+          </a:p>
+          <a:p>
+            <a:pPr lvl="2"/>
+            <a:r>
+              <a:rPr lang="en-US" dirty="0" err="1"/>
+              <a:t>dst</a:t>
             </a:r>
             <a:r>
               <a:rPr lang="en-US" dirty="0"/>
-              <a:t>– prints a given buffer as a series of hex values </a:t>
-            </a:r>
-          </a:p>
-          <a:p>
-            <a:r>
-              <a:rPr lang="en-US" b="1" dirty="0" err="1"/>
-              <a:t>emberAfCorePrintString</a:t>
-            </a:r>
-            <a:r>
-              <a:rPr lang="en-US" b="1" dirty="0"/>
-              <a:t>( buffer ) </a:t>
-            </a:r>
-            <a:r>
-              <a:rPr lang="en-US" dirty="0"/>
-              <a:t>– prints a given buffer as a string of characters </a:t>
-            </a:r>
-            <a:br>
-              <a:rPr lang="en-US" dirty="0"/>
-            </a:br>
+              <a:t>-endpoint - INT8U - The endpoint to send the message to</a:t>
+            </a:r>
+          </a:p>
+          <a:p>
             <a:endParaRPr lang="en-US" dirty="0"/>
           </a:p>
         </p:txBody>
@@ -25646,7 +25672,7 @@
     </p:spTree>
     <p:extLst>
       <p:ext uri="{BB962C8B-B14F-4D97-AF65-F5344CB8AC3E}">
-        <p14:creationId xmlns:p14="http://schemas.microsoft.com/office/powerpoint/2010/main" val="3000147220"/>
+        <p14:creationId xmlns:p14="http://schemas.microsoft.com/office/powerpoint/2010/main" val="1366958089"/>
       </p:ext>
     </p:extLst>
   </p:cSld>
@@ -25925,6 +25951,114 @@
           </a:prstGeom>
         </p:spPr>
       </p:pic>
+      <p:sp>
+        <p:nvSpPr>
+          <p:cNvPr id="11" name="Rectangle 10">
+            <a:extLst>
+              <a:ext uri="{FF2B5EF4-FFF2-40B4-BE49-F238E27FC236}">
+                <a16:creationId xmlns:a16="http://schemas.microsoft.com/office/drawing/2014/main" id="{E585C2E2-CA52-4951-9EF5-BE9FF707751C}"/>
+              </a:ext>
+            </a:extLst>
+          </p:cNvPr>
+          <p:cNvSpPr/>
+          <p:nvPr/>
+        </p:nvSpPr>
+        <p:spPr>
+          <a:xfrm>
+            <a:off x="3999081" y="1749197"/>
+            <a:ext cx="3002055" cy="3200400"/>
+          </a:xfrm>
+          <a:prstGeom prst="rect">
+            <a:avLst/>
+          </a:prstGeom>
+          <a:solidFill>
+            <a:schemeClr val="bg1">
+              <a:alpha val="60000"/>
+            </a:schemeClr>
+          </a:solidFill>
+          <a:ln>
+            <a:noFill/>
+          </a:ln>
+        </p:spPr>
+        <p:style>
+          <a:lnRef idx="2">
+            <a:schemeClr val="accent1">
+              <a:shade val="50000"/>
+            </a:schemeClr>
+          </a:lnRef>
+          <a:fillRef idx="1">
+            <a:schemeClr val="accent1"/>
+          </a:fillRef>
+          <a:effectRef idx="0">
+            <a:schemeClr val="accent1"/>
+          </a:effectRef>
+          <a:fontRef idx="minor">
+            <a:schemeClr val="lt1"/>
+          </a:fontRef>
+        </p:style>
+        <p:txBody>
+          <a:bodyPr rtlCol="0" anchor="ctr"/>
+          <a:lstStyle/>
+          <a:p>
+            <a:pPr algn="ctr"/>
+            <a:endParaRPr lang="en-US"/>
+          </a:p>
+        </p:txBody>
+      </p:sp>
+      <p:sp>
+        <p:nvSpPr>
+          <p:cNvPr id="12" name="Rectangle 11">
+            <a:extLst>
+              <a:ext uri="{FF2B5EF4-FFF2-40B4-BE49-F238E27FC236}">
+                <a16:creationId xmlns:a16="http://schemas.microsoft.com/office/drawing/2014/main" id="{D90D8818-4290-46B7-AF12-577BF93AA505}"/>
+              </a:ext>
+            </a:extLst>
+          </p:cNvPr>
+          <p:cNvSpPr/>
+          <p:nvPr/>
+        </p:nvSpPr>
+        <p:spPr>
+          <a:xfrm>
+            <a:off x="7620749" y="1749197"/>
+            <a:ext cx="3885450" cy="3200400"/>
+          </a:xfrm>
+          <a:prstGeom prst="rect">
+            <a:avLst/>
+          </a:prstGeom>
+          <a:solidFill>
+            <a:schemeClr val="bg1">
+              <a:alpha val="60000"/>
+            </a:schemeClr>
+          </a:solidFill>
+          <a:ln>
+            <a:noFill/>
+          </a:ln>
+        </p:spPr>
+        <p:style>
+          <a:lnRef idx="2">
+            <a:schemeClr val="accent1">
+              <a:shade val="50000"/>
+            </a:schemeClr>
+          </a:lnRef>
+          <a:fillRef idx="1">
+            <a:schemeClr val="accent1"/>
+          </a:fillRef>
+          <a:effectRef idx="0">
+            <a:schemeClr val="accent1"/>
+          </a:effectRef>
+          <a:fontRef idx="minor">
+            <a:schemeClr val="lt1"/>
+          </a:fontRef>
+        </p:style>
+        <p:txBody>
+          <a:bodyPr rtlCol="0" anchor="ctr"/>
+          <a:lstStyle/>
+          <a:p>
+            <a:pPr algn="ctr"/>
+            <a:endParaRPr lang="en-US"/>
+          </a:p>
+        </p:txBody>
+      </p:sp>
     </p:spTree>
     <p:extLst>
       <p:ext uri="{BB962C8B-B14F-4D97-AF65-F5344CB8AC3E}">
@@ -25942,6 +26076,159 @@
 </file>
 
 <file path=ppt/slides/slide30.xml><?xml version="1.0" encoding="utf-8"?>
+<p:sld xmlns:a="http://schemas.openxmlformats.org/drawingml/2006/main" xmlns:r="http://schemas.openxmlformats.org/officeDocument/2006/relationships" xmlns:p="http://schemas.openxmlformats.org/presentationml/2006/main">
+  <p:cSld>
+    <p:spTree>
+      <p:nvGrpSpPr>
+        <p:cNvPr id="1" name=""/>
+        <p:cNvGrpSpPr/>
+        <p:nvPr/>
+      </p:nvGrpSpPr>
+      <p:grpSpPr>
+        <a:xfrm>
+          <a:off x="0" y="0"/>
+          <a:ext cx="0" cy="0"/>
+          <a:chOff x="0" y="0"/>
+          <a:chExt cx="0" cy="0"/>
+        </a:xfrm>
+      </p:grpSpPr>
+      <p:sp>
+        <p:nvSpPr>
+          <p:cNvPr id="3" name="Title 2"/>
+          <p:cNvSpPr>
+            <a:spLocks noGrp="1"/>
+          </p:cNvSpPr>
+          <p:nvPr>
+            <p:ph type="title"/>
+          </p:nvPr>
+        </p:nvSpPr>
+        <p:spPr/>
+        <p:txBody>
+          <a:bodyPr/>
+          <a:lstStyle/>
+          <a:p>
+            <a:r>
+              <a:rPr lang="en-US" dirty="0"/>
+              <a:t>Debug</a:t>
+            </a:r>
+          </a:p>
+        </p:txBody>
+      </p:sp>
+      <p:sp>
+        <p:nvSpPr>
+          <p:cNvPr id="5" name="Content Placeholder 4">
+            <a:extLst>
+              <a:ext uri="{FF2B5EF4-FFF2-40B4-BE49-F238E27FC236}">
+                <a16:creationId xmlns:a16="http://schemas.microsoft.com/office/drawing/2014/main" id="{76CEF9E2-781A-4501-9447-AE0C0C250B03}"/>
+              </a:ext>
+            </a:extLst>
+          </p:cNvPr>
+          <p:cNvSpPr>
+            <a:spLocks noGrp="1"/>
+          </p:cNvSpPr>
+          <p:nvPr>
+            <p:ph idx="10"/>
+          </p:nvPr>
+        </p:nvSpPr>
+        <p:spPr/>
+        <p:txBody>
+          <a:bodyPr/>
+          <a:lstStyle/>
+          <a:p>
+            <a:r>
+              <a:rPr lang="en-US" b="1" dirty="0" err="1"/>
+              <a:t>emberAfCorePrint</a:t>
+            </a:r>
+            <a:r>
+              <a:rPr lang="en-US" b="1" dirty="0"/>
+              <a:t>(…) </a:t>
+            </a:r>
+            <a:r>
+              <a:rPr lang="en-US" dirty="0"/>
+              <a:t>- prints a single line without a carriage return </a:t>
+            </a:r>
+          </a:p>
+          <a:p>
+            <a:r>
+              <a:rPr lang="en-US" b="1" dirty="0" err="1"/>
+              <a:t>emberAfCorePrintln</a:t>
+            </a:r>
+            <a:r>
+              <a:rPr lang="en-US" b="1" dirty="0"/>
+              <a:t>(…) </a:t>
+            </a:r>
+            <a:r>
+              <a:rPr lang="en-US" dirty="0"/>
+              <a:t>- prints a single line with a carriage return </a:t>
+            </a:r>
+          </a:p>
+          <a:p>
+            <a:r>
+              <a:rPr lang="en-US" b="1" dirty="0" err="1"/>
+              <a:t>emberAfCorePrintBuffer</a:t>
+            </a:r>
+            <a:r>
+              <a:rPr lang="en-US" b="1" dirty="0"/>
+              <a:t>( buffer, </a:t>
+            </a:r>
+            <a:r>
+              <a:rPr lang="en-US" b="1" dirty="0" err="1"/>
+              <a:t>len</a:t>
+            </a:r>
+            <a:r>
+              <a:rPr lang="en-US" b="1" dirty="0"/>
+              <a:t>, </a:t>
+            </a:r>
+            <a:r>
+              <a:rPr lang="en-US" b="1" dirty="0" err="1"/>
+              <a:t>withspace</a:t>
+            </a:r>
+            <a:r>
+              <a:rPr lang="en-US" b="1" dirty="0"/>
+              <a:t> ) </a:t>
+            </a:r>
+            <a:r>
+              <a:rPr lang="en-US" dirty="0"/>
+              <a:t>– prints a given buffer as a series of hex values </a:t>
+            </a:r>
+          </a:p>
+          <a:p>
+            <a:r>
+              <a:rPr lang="en-US" b="1" dirty="0" err="1"/>
+              <a:t>emberAfCorePrintString</a:t>
+            </a:r>
+            <a:r>
+              <a:rPr lang="en-US" b="1" dirty="0"/>
+              <a:t>( buffer ) </a:t>
+            </a:r>
+            <a:r>
+              <a:rPr lang="en-US" dirty="0"/>
+              <a:t>– prints a given buffer as a string of characters </a:t>
+            </a:r>
+            <a:br>
+              <a:rPr lang="en-US" dirty="0"/>
+            </a:br>
+            <a:endParaRPr lang="en-US" dirty="0"/>
+          </a:p>
+        </p:txBody>
+      </p:sp>
+    </p:spTree>
+    <p:extLst>
+      <p:ext uri="{BB962C8B-B14F-4D97-AF65-F5344CB8AC3E}">
+        <p14:creationId xmlns:p14="http://schemas.microsoft.com/office/powerpoint/2010/main" val="3000147220"/>
+      </p:ext>
+    </p:extLst>
+  </p:cSld>
+  <p:clrMapOvr>
+    <a:masterClrMapping/>
+  </p:clrMapOvr>
+  <p:transition spd="med">
+    <p:wipe/>
+  </p:transition>
+</p:sld>
+</file>
+
+<file path=ppt/slides/slide31.xml><?xml version="1.0" encoding="utf-8"?>
 <p:sld xmlns:a="http://schemas.openxmlformats.org/drawingml/2006/main" xmlns:r="http://schemas.openxmlformats.org/officeDocument/2006/relationships" xmlns:p="http://schemas.openxmlformats.org/presentationml/2006/main">
   <p:cSld>
     <p:spTree>
@@ -26102,7 +26389,7 @@
 </p:sld>
 </file>
 
-<file path=ppt/slides/slide31.xml><?xml version="1.0" encoding="utf-8"?>
+<file path=ppt/slides/slide32.xml><?xml version="1.0" encoding="utf-8"?>
 <p:sld xmlns:a="http://schemas.openxmlformats.org/drawingml/2006/main" xmlns:r="http://schemas.openxmlformats.org/officeDocument/2006/relationships" xmlns:p="http://schemas.openxmlformats.org/presentationml/2006/main">
   <p:cSld>
     <p:spTree>
@@ -45356,6 +45643,21 @@
 </file>
 
 <file path=customXml/item1.xml><?xml version="1.0" encoding="utf-8"?>
+<p:properties xmlns:p="http://schemas.microsoft.com/office/2006/metadata/properties" xmlns:xsi="http://www.w3.org/2001/XMLSchema-instance" xmlns:pc="http://schemas.microsoft.com/office/infopath/2007/PartnerControls">
+  <documentManagement/>
+</p:properties>
+</file>
+
+<file path=customXml/item2.xml><?xml version="1.0" encoding="utf-8"?>
+<?mso-contentType ?>
+<FormTemplates xmlns="http://schemas.microsoft.com/sharepoint/v3/contenttype/forms">
+  <Display>DocumentLibraryForm</Display>
+  <Edit>DocumentLibraryForm</Edit>
+  <New>DocumentLibraryForm</New>
+</FormTemplates>
+</file>
+
+<file path=customXml/item3.xml><?xml version="1.0" encoding="utf-8"?>
 <ct:contentTypeSchema xmlns:ct="http://schemas.microsoft.com/office/2006/metadata/contentType" xmlns:ma="http://schemas.microsoft.com/office/2006/metadata/properties/metaAttributes" ct:_="" ma:_="" ma:contentTypeName="Document" ma:contentTypeID="0x010100B21F7AB2AB09B744870FD2BB34F58D4C" ma:contentTypeVersion="0" ma:contentTypeDescription="Create a new document." ma:contentTypeScope="" ma:versionID="610a13794e9c15d6bc8a774371eef038">
   <xsd:schema xmlns:xsd="http://www.w3.org/2001/XMLSchema" xmlns:xs="http://www.w3.org/2001/XMLSchema" xmlns:p="http://schemas.microsoft.com/office/2006/metadata/properties" targetNamespace="http://schemas.microsoft.com/office/2006/metadata/properties" ma:root="true" ma:fieldsID="1b05d82d297216baf5b26c55225140df">
     <xsd:element name="properties">
@@ -45469,22 +45771,30 @@
 </ct:contentTypeSchema>
 </file>
 
-<file path=customXml/item2.xml><?xml version="1.0" encoding="utf-8"?>
-<?mso-contentType ?>
-<FormTemplates xmlns="http://schemas.microsoft.com/sharepoint/v3/contenttype/forms">
-  <Display>DocumentLibraryForm</Display>
-  <Edit>DocumentLibraryForm</Edit>
-  <New>DocumentLibraryForm</New>
-</FormTemplates>
+<file path=customXml/itemProps1.xml><?xml version="1.0" encoding="utf-8"?>
+<ds:datastoreItem xmlns:ds="http://schemas.openxmlformats.org/officeDocument/2006/customXml" ds:itemID="{88E5C257-99A9-40B2-A1DE-0EB62604DA9C}">
+  <ds:schemaRefs>
+    <ds:schemaRef ds:uri="http://purl.org/dc/terms/"/>
+    <ds:schemaRef ds:uri="http://schemas.openxmlformats.org/package/2006/metadata/core-properties"/>
+    <ds:schemaRef ds:uri="http://schemas.microsoft.com/office/2006/documentManagement/types"/>
+    <ds:schemaRef ds:uri="http://schemas.microsoft.com/office/infopath/2007/PartnerControls"/>
+    <ds:schemaRef ds:uri="http://purl.org/dc/elements/1.1/"/>
+    <ds:schemaRef ds:uri="http://schemas.microsoft.com/office/2006/metadata/properties"/>
+    <ds:schemaRef ds:uri="http://www.w3.org/XML/1998/namespace"/>
+    <ds:schemaRef ds:uri="http://purl.org/dc/dcmitype/"/>
+  </ds:schemaRefs>
+</ds:datastoreItem>
 </file>
 
-<file path=customXml/item3.xml><?xml version="1.0" encoding="utf-8"?>
-<p:properties xmlns:p="http://schemas.microsoft.com/office/2006/metadata/properties" xmlns:xsi="http://www.w3.org/2001/XMLSchema-instance" xmlns:pc="http://schemas.microsoft.com/office/infopath/2007/PartnerControls">
-  <documentManagement/>
-</p:properties>
+<file path=customXml/itemProps2.xml><?xml version="1.0" encoding="utf-8"?>
+<ds:datastoreItem xmlns:ds="http://schemas.openxmlformats.org/officeDocument/2006/customXml" ds:itemID="{4DD62670-B0F9-4782-967B-54D0F2A11DD3}">
+  <ds:schemaRefs>
+    <ds:schemaRef ds:uri="http://schemas.microsoft.com/sharepoint/v3/contenttype/forms"/>
+  </ds:schemaRefs>
+</ds:datastoreItem>
 </file>
 
-<file path=customXml/itemProps1.xml><?xml version="1.0" encoding="utf-8"?>
+<file path=customXml/itemProps3.xml><?xml version="1.0" encoding="utf-8"?>
 <ds:datastoreItem xmlns:ds="http://schemas.openxmlformats.org/officeDocument/2006/customXml" ds:itemID="{59925F4A-05CC-4D19-A5F3-6B37E808F6A7}">
   <ds:schemaRefs>
     <ds:schemaRef ds:uri="http://schemas.microsoft.com/office/2006/metadata/contentType"/>
@@ -45498,27 +45808,4 @@
     <ds:schemaRef ds:uri="http://schemas.microsoft.com/office/infopath/2007/PartnerControls"/>
   </ds:schemaRefs>
 </ds:datastoreItem>
-</file>
-
-<file path=customXml/itemProps2.xml><?xml version="1.0" encoding="utf-8"?>
-<ds:datastoreItem xmlns:ds="http://schemas.openxmlformats.org/officeDocument/2006/customXml" ds:itemID="{4DD62670-B0F9-4782-967B-54D0F2A11DD3}">
-  <ds:schemaRefs>
-    <ds:schemaRef ds:uri="http://schemas.microsoft.com/sharepoint/v3/contenttype/forms"/>
-  </ds:schemaRefs>
-</ds:datastoreItem>
-</file>
-
-<file path=customXml/itemProps3.xml><?xml version="1.0" encoding="utf-8"?>
-<ds:datastoreItem xmlns:ds="http://schemas.openxmlformats.org/officeDocument/2006/customXml" ds:itemID="{88E5C257-99A9-40B2-A1DE-0EB62604DA9C}">
-  <ds:schemaRefs>
-    <ds:schemaRef ds:uri="http://purl.org/dc/terms/"/>
-    <ds:schemaRef ds:uri="http://schemas.openxmlformats.org/package/2006/metadata/core-properties"/>
-    <ds:schemaRef ds:uri="http://schemas.microsoft.com/office/2006/documentManagement/types"/>
-    <ds:schemaRef ds:uri="http://schemas.microsoft.com/office/infopath/2007/PartnerControls"/>
-    <ds:schemaRef ds:uri="http://purl.org/dc/elements/1.1/"/>
-    <ds:schemaRef ds:uri="http://schemas.microsoft.com/office/2006/metadata/properties"/>
-    <ds:schemaRef ds:uri="http://www.w3.org/XML/1998/namespace"/>
-    <ds:schemaRef ds:uri="http://purl.org/dc/dcmitype/"/>
-  </ds:schemaRefs>
-</ds:datastoreItem>
 </file>
</xml_diff>

<commit_message>
[DOC IMP] [#22][#26]rework according to comments on issue #22 and #26 (#14)
* [DOC] rework according to comments on issue #22 and #26
* [DOC] rework according to comments on issue #27
</commit_message>
<xml_diff>
--- a/zigbee/EmberZnet and WSTK.pptx
+++ b/zigbee/EmberZnet and WSTK.pptx
@@ -5,7 +5,7 @@
     <p:sldMasterId id="2147484033" r:id="rId4"/>
   </p:sldMasterIdLst>
   <p:notesMasterIdLst>
-    <p:notesMasterId r:id="rId36"/>
+    <p:notesMasterId r:id="rId37"/>
   </p:notesMasterIdLst>
   <p:sldIdLst>
     <p:sldId id="257" r:id="rId5"/>
@@ -33,12 +33,13 @@
     <p:sldId id="936" r:id="rId27"/>
     <p:sldId id="957" r:id="rId28"/>
     <p:sldId id="934" r:id="rId29"/>
-    <p:sldId id="960" r:id="rId30"/>
-    <p:sldId id="943" r:id="rId31"/>
-    <p:sldId id="958" r:id="rId32"/>
-    <p:sldId id="939" r:id="rId33"/>
-    <p:sldId id="959" r:id="rId34"/>
-    <p:sldId id="284" r:id="rId35"/>
+    <p:sldId id="961" r:id="rId30"/>
+    <p:sldId id="960" r:id="rId31"/>
+    <p:sldId id="943" r:id="rId32"/>
+    <p:sldId id="958" r:id="rId33"/>
+    <p:sldId id="939" r:id="rId34"/>
+    <p:sldId id="959" r:id="rId35"/>
+    <p:sldId id="284" r:id="rId36"/>
   </p:sldIdLst>
   <p:sldSz cx="12192000" cy="6858000"/>
   <p:notesSz cx="7010400" cy="9296400"/>
@@ -165,20 +166,6 @@
 </p:cmAuthorLst>
 </file>
 
-<file path=ppt/comments/comment1.xml><?xml version="1.0" encoding="utf-8"?>
-<p:cmLst xmlns:a="http://schemas.openxmlformats.org/drawingml/2006/main" xmlns:r="http://schemas.openxmlformats.org/officeDocument/2006/relationships" xmlns:p="http://schemas.openxmlformats.org/presentationml/2006/main">
-  <p:cm authorId="2" dt="2019-11-05T16:05:00.751" idx="1">
-    <p:pos x="10" y="10"/>
-    <p:text>Add pictures here</p:text>
-    <p:extLst>
-      <p:ext uri="{C676402C-5697-4E1C-873F-D02D1690AC5C}">
-        <p15:threadingInfo xmlns:p15="http://schemas.microsoft.com/office/powerpoint/2012/main" timeZoneBias="-480"/>
-      </p:ext>
-    </p:extLst>
-  </p:cm>
-</p:cmLst>
-</file>
-
 <file path=ppt/notesMasters/notesMaster1.xml><?xml version="1.0" encoding="utf-8"?>
 <p:notesMaster xmlns:a="http://schemas.openxmlformats.org/drawingml/2006/main" xmlns:r="http://schemas.openxmlformats.org/officeDocument/2006/relationships" xmlns:p="http://schemas.openxmlformats.org/presentationml/2006/main">
   <p:cSld>
@@ -261,7 +248,7 @@
           <a:p>
             <a:fld id="{3CAB3C29-341D-6743-A203-2F7086D57830}" type="datetimeFigureOut">
               <a:rPr lang="en-US" smtClean="0"/>
-              <a:t>2019-11-08</a:t>
+              <a:t>2019-11-25</a:t>
             </a:fld>
             <a:endParaRPr lang="en-US"/>
           </a:p>
@@ -2201,37 +2188,6 @@
           <a:bodyPr/>
           <a:lstStyle/>
           <a:p>
-            <a:r>
-              <a:rPr lang="en-US" dirty="0"/>
-              <a:t>Silicon Labs has a great development platform based on the Wireless STK and radio boards.  The</a:t>
-            </a:r>
-            <a:r>
-              <a:rPr lang="en-US" baseline="0" dirty="0"/>
-              <a:t> Wireless STK provides the starting point for development providing the hardware and access to mesh software.  </a:t>
-            </a:r>
-          </a:p>
-          <a:p>
-            <a:endParaRPr lang="en-US" baseline="0" dirty="0"/>
-          </a:p>
-          <a:p>
-            <a:r>
-              <a:rPr lang="en-US" baseline="0" dirty="0"/>
-              <a:t>Different radio boards for both </a:t>
-            </a:r>
-            <a:r>
-              <a:rPr lang="en-US" baseline="0" dirty="0" err="1"/>
-              <a:t>SoCs</a:t>
-            </a:r>
-            <a:r>
-              <a:rPr lang="en-US" baseline="0" dirty="0"/>
-              <a:t> and modules plug into the WSTK main boards, providing a unified development platform from both the hardware and software perspective.</a:t>
-            </a:r>
-            <a:endParaRPr lang="en-US" dirty="0"/>
-          </a:p>
-          <a:p>
-            <a:endParaRPr lang="en-US" dirty="0"/>
-          </a:p>
-          <a:p>
             <a:endParaRPr lang="en-US" dirty="0"/>
           </a:p>
         </p:txBody>
@@ -2406,6 +2362,12 @@
           <a:bodyPr/>
           <a:lstStyle/>
           <a:p>
+            <a:r>
+              <a:rPr lang="en-US" dirty="0"/>
+              <a:t>Show the generated files.</a:t>
+            </a:r>
+          </a:p>
+          <a:p>
             <a:endParaRPr lang="en-US" dirty="0"/>
           </a:p>
         </p:txBody>
@@ -2436,7 +2398,7 @@
     </p:spTree>
     <p:extLst>
       <p:ext uri="{BB962C8B-B14F-4D97-AF65-F5344CB8AC3E}">
-        <p14:creationId xmlns:p14="http://schemas.microsoft.com/office/powerpoint/2010/main" val="932156101"/>
+        <p14:creationId xmlns:p14="http://schemas.microsoft.com/office/powerpoint/2010/main" val="3527585072"/>
       </p:ext>
     </p:extLst>
   </p:cSld>
@@ -2520,7 +2482,7 @@
     </p:spTree>
     <p:extLst>
       <p:ext uri="{BB962C8B-B14F-4D97-AF65-F5344CB8AC3E}">
-        <p14:creationId xmlns:p14="http://schemas.microsoft.com/office/powerpoint/2010/main" val="1177770956"/>
+        <p14:creationId xmlns:p14="http://schemas.microsoft.com/office/powerpoint/2010/main" val="932156101"/>
       </p:ext>
     </p:extLst>
   </p:cSld>
@@ -2604,7 +2566,7 @@
     </p:spTree>
     <p:extLst>
       <p:ext uri="{BB962C8B-B14F-4D97-AF65-F5344CB8AC3E}">
-        <p14:creationId xmlns:p14="http://schemas.microsoft.com/office/powerpoint/2010/main" val="1966343220"/>
+        <p14:creationId xmlns:p14="http://schemas.microsoft.com/office/powerpoint/2010/main" val="1177770956"/>
       </p:ext>
     </p:extLst>
   </p:cSld>
@@ -2688,7 +2650,7 @@
     </p:spTree>
     <p:extLst>
       <p:ext uri="{BB962C8B-B14F-4D97-AF65-F5344CB8AC3E}">
-        <p14:creationId xmlns:p14="http://schemas.microsoft.com/office/powerpoint/2010/main" val="1141249835"/>
+        <p14:creationId xmlns:p14="http://schemas.microsoft.com/office/powerpoint/2010/main" val="1966343220"/>
       </p:ext>
     </p:extLst>
   </p:cSld>
@@ -2874,7 +2836,7 @@
     </p:spTree>
     <p:extLst>
       <p:ext uri="{BB962C8B-B14F-4D97-AF65-F5344CB8AC3E}">
-        <p14:creationId xmlns:p14="http://schemas.microsoft.com/office/powerpoint/2010/main" val="3359557430"/>
+        <p14:creationId xmlns:p14="http://schemas.microsoft.com/office/powerpoint/2010/main" val="1141249835"/>
       </p:ext>
     </p:extLst>
   </p:cSld>
@@ -2950,6 +2912,90 @@
             <a:fld id="{D81990A0-AC65-4980-BF02-6ACC1434AAED}" type="slidenum">
               <a:rPr lang="en-US" smtClean="0"/>
               <a:t>31</a:t>
+            </a:fld>
+            <a:endParaRPr lang="en-US"/>
+          </a:p>
+        </p:txBody>
+      </p:sp>
+    </p:spTree>
+    <p:extLst>
+      <p:ext uri="{BB962C8B-B14F-4D97-AF65-F5344CB8AC3E}">
+        <p14:creationId xmlns:p14="http://schemas.microsoft.com/office/powerpoint/2010/main" val="3359557430"/>
+      </p:ext>
+    </p:extLst>
+  </p:cSld>
+  <p:clrMapOvr>
+    <a:masterClrMapping/>
+  </p:clrMapOvr>
+</p:notes>
+</file>
+
+<file path=ppt/notesSlides/notesSlide32.xml><?xml version="1.0" encoding="utf-8"?>
+<p:notes xmlns:a="http://schemas.openxmlformats.org/drawingml/2006/main" xmlns:r="http://schemas.openxmlformats.org/officeDocument/2006/relationships" xmlns:p="http://schemas.openxmlformats.org/presentationml/2006/main">
+  <p:cSld>
+    <p:spTree>
+      <p:nvGrpSpPr>
+        <p:cNvPr id="1" name=""/>
+        <p:cNvGrpSpPr/>
+        <p:nvPr/>
+      </p:nvGrpSpPr>
+      <p:grpSpPr>
+        <a:xfrm>
+          <a:off x="0" y="0"/>
+          <a:ext cx="0" cy="0"/>
+          <a:chOff x="0" y="0"/>
+          <a:chExt cx="0" cy="0"/>
+        </a:xfrm>
+      </p:grpSpPr>
+      <p:sp>
+        <p:nvSpPr>
+          <p:cNvPr id="2" name="Slide Image Placeholder 1"/>
+          <p:cNvSpPr>
+            <a:spLocks noGrp="1" noRot="1" noChangeAspect="1"/>
+          </p:cNvSpPr>
+          <p:nvPr>
+            <p:ph type="sldImg"/>
+          </p:nvPr>
+        </p:nvSpPr>
+        <p:spPr/>
+      </p:sp>
+      <p:sp>
+        <p:nvSpPr>
+          <p:cNvPr id="3" name="Notes Placeholder 2"/>
+          <p:cNvSpPr>
+            <a:spLocks noGrp="1"/>
+          </p:cNvSpPr>
+          <p:nvPr>
+            <p:ph type="body" idx="1"/>
+          </p:nvPr>
+        </p:nvSpPr>
+        <p:spPr/>
+        <p:txBody>
+          <a:bodyPr/>
+          <a:lstStyle/>
+          <a:p>
+            <a:endParaRPr lang="en-US" dirty="0"/>
+          </a:p>
+        </p:txBody>
+      </p:sp>
+      <p:sp>
+        <p:nvSpPr>
+          <p:cNvPr id="4" name="Slide Number Placeholder 3"/>
+          <p:cNvSpPr>
+            <a:spLocks noGrp="1"/>
+          </p:cNvSpPr>
+          <p:nvPr>
+            <p:ph type="sldNum" sz="quarter" idx="10"/>
+          </p:nvPr>
+        </p:nvSpPr>
+        <p:spPr/>
+        <p:txBody>
+          <a:bodyPr/>
+          <a:lstStyle/>
+          <a:p>
+            <a:fld id="{D81990A0-AC65-4980-BF02-6ACC1434AAED}" type="slidenum">
+              <a:rPr lang="en-US" smtClean="0"/>
+              <a:t>32</a:t>
             </a:fld>
             <a:endParaRPr lang="en-US"/>
           </a:p>
@@ -19233,7 +19279,7 @@
           <a:p>
             <a:r>
               <a:rPr lang="en-US" dirty="0"/>
-              <a:t>2019 Jim Lin</a:t>
+              <a:t>2019</a:t>
             </a:r>
           </a:p>
         </p:txBody>
@@ -20715,78 +20761,126 @@
           </a:p>
         </p:txBody>
       </p:sp>
-      <p:sp>
-        <p:nvSpPr>
-          <p:cNvPr id="15" name="Text Placeholder 2">
+      <p:pic>
+        <p:nvPicPr>
+          <p:cNvPr id="2" name="Picture 1">
             <a:extLst>
               <a:ext uri="{FF2B5EF4-FFF2-40B4-BE49-F238E27FC236}">
-                <a16:creationId xmlns:a16="http://schemas.microsoft.com/office/drawing/2014/main" id="{68B6F77B-DCE8-4F5A-99DF-7C0A7A6B19F4}"/>
+                <a16:creationId xmlns:a16="http://schemas.microsoft.com/office/drawing/2014/main" id="{32F4DE3E-F231-484F-BD29-8B879D3A2604}"/>
               </a:ext>
             </a:extLst>
           </p:cNvPr>
-          <p:cNvSpPr>
-            <a:spLocks noGrp="1"/>
-          </p:cNvSpPr>
-          <p:nvPr>
-            <p:ph idx="10"/>
-          </p:nvPr>
-        </p:nvSpPr>
+          <p:cNvPicPr>
+            <a:picLocks noChangeAspect="1"/>
+          </p:cNvPicPr>
+          <p:nvPr/>
+        </p:nvPicPr>
+        <p:blipFill>
+          <a:blip r:embed="rId3"/>
+          <a:stretch>
+            <a:fillRect/>
+          </a:stretch>
+        </p:blipFill>
         <p:spPr>
           <a:xfrm>
-            <a:off x="679450" y="1143000"/>
-            <a:ext cx="10820400" cy="5029200"/>
+            <a:off x="4876126" y="1191419"/>
+            <a:ext cx="4210050" cy="1171575"/>
           </a:xfrm>
+          <a:prstGeom prst="rect">
+            <a:avLst/>
+          </a:prstGeom>
         </p:spPr>
-        <p:txBody>
-          <a:bodyPr/>
-          <a:lstStyle/>
-          <a:p>
-            <a:r>
-              <a:rPr lang="en-US" dirty="0"/>
-              <a:t>Simplicity Studio IDE</a:t>
-            </a:r>
-          </a:p>
-          <a:p>
-            <a:pPr lvl="1"/>
-            <a:r>
-              <a:rPr lang="en-US" dirty="0" err="1"/>
-              <a:t>AppBuilder</a:t>
-            </a:r>
-            <a:endParaRPr lang="en-US" dirty="0"/>
-          </a:p>
-          <a:p>
-            <a:pPr lvl="1"/>
-            <a:r>
-              <a:rPr lang="en-US" dirty="0"/>
-              <a:t>Hardware Configurator</a:t>
-            </a:r>
-          </a:p>
-          <a:p>
-            <a:pPr lvl="1"/>
-            <a:r>
-              <a:rPr lang="en-US" dirty="0"/>
-              <a:t>Network Analyzer</a:t>
-            </a:r>
-          </a:p>
-          <a:p>
-            <a:pPr lvl="1"/>
-            <a:r>
-              <a:rPr lang="en-US" dirty="0"/>
-              <a:t>Energy Profiler</a:t>
-            </a:r>
-          </a:p>
-          <a:p>
-            <a:pPr lvl="1"/>
-            <a:r>
-              <a:rPr lang="en-US" dirty="0"/>
-              <a:t>Simplicity Commander</a:t>
-            </a:r>
-          </a:p>
-          <a:p>
-            <a:endParaRPr lang="en-US" dirty="0"/>
-          </a:p>
-        </p:txBody>
-      </p:sp>
+      </p:pic>
+      <p:pic>
+        <p:nvPicPr>
+          <p:cNvPr id="4" name="Picture 3">
+            <a:extLst>
+              <a:ext uri="{FF2B5EF4-FFF2-40B4-BE49-F238E27FC236}">
+                <a16:creationId xmlns:a16="http://schemas.microsoft.com/office/drawing/2014/main" id="{D2E63295-6546-4B95-B237-BAFF42C8D21A}"/>
+              </a:ext>
+            </a:extLst>
+          </p:cNvPr>
+          <p:cNvPicPr>
+            <a:picLocks noChangeAspect="1"/>
+          </p:cNvPicPr>
+          <p:nvPr/>
+        </p:nvPicPr>
+        <p:blipFill>
+          <a:blip r:embed="rId4"/>
+          <a:stretch>
+            <a:fillRect/>
+          </a:stretch>
+        </p:blipFill>
+        <p:spPr>
+          <a:xfrm>
+            <a:off x="4876126" y="2640013"/>
+            <a:ext cx="5133975" cy="1619250"/>
+          </a:xfrm>
+          <a:prstGeom prst="rect">
+            <a:avLst/>
+          </a:prstGeom>
+        </p:spPr>
+      </p:pic>
+      <p:pic>
+        <p:nvPicPr>
+          <p:cNvPr id="7" name="Picture 6">
+            <a:extLst>
+              <a:ext uri="{FF2B5EF4-FFF2-40B4-BE49-F238E27FC236}">
+                <a16:creationId xmlns:a16="http://schemas.microsoft.com/office/drawing/2014/main" id="{F7429A17-9633-4CAB-8F82-7DF34AEBE6B8}"/>
+              </a:ext>
+            </a:extLst>
+          </p:cNvPr>
+          <p:cNvPicPr>
+            <a:picLocks noChangeAspect="1"/>
+          </p:cNvPicPr>
+          <p:nvPr/>
+        </p:nvPicPr>
+        <p:blipFill>
+          <a:blip r:embed="rId5"/>
+          <a:stretch>
+            <a:fillRect/>
+          </a:stretch>
+        </p:blipFill>
+        <p:spPr>
+          <a:xfrm>
+            <a:off x="4876126" y="4259263"/>
+            <a:ext cx="3933825" cy="1123950"/>
+          </a:xfrm>
+          <a:prstGeom prst="rect">
+            <a:avLst/>
+          </a:prstGeom>
+        </p:spPr>
+      </p:pic>
+      <p:pic>
+        <p:nvPicPr>
+          <p:cNvPr id="8" name="Picture 7">
+            <a:extLst>
+              <a:ext uri="{FF2B5EF4-FFF2-40B4-BE49-F238E27FC236}">
+                <a16:creationId xmlns:a16="http://schemas.microsoft.com/office/drawing/2014/main" id="{25C9CA43-8AFB-42D0-94D7-A5C4CA1D6F1C}"/>
+              </a:ext>
+            </a:extLst>
+          </p:cNvPr>
+          <p:cNvPicPr>
+            <a:picLocks noChangeAspect="1"/>
+          </p:cNvPicPr>
+          <p:nvPr/>
+        </p:nvPicPr>
+        <p:blipFill>
+          <a:blip r:embed="rId6"/>
+          <a:stretch>
+            <a:fillRect/>
+          </a:stretch>
+        </p:blipFill>
+        <p:spPr>
+          <a:xfrm>
+            <a:off x="761326" y="2836862"/>
+            <a:ext cx="3690024" cy="1533525"/>
+          </a:xfrm>
+          <a:prstGeom prst="rect">
+            <a:avLst/>
+          </a:prstGeom>
+        </p:spPr>
+      </p:pic>
     </p:spTree>
     <p:extLst>
       <p:ext uri="{BB962C8B-B14F-4D97-AF65-F5344CB8AC3E}">
@@ -24937,6 +25031,91 @@
           <a:p>
             <a:r>
               <a:rPr lang="en-US" dirty="0"/>
+              <a:t>Hardware Configurator</a:t>
+            </a:r>
+          </a:p>
+        </p:txBody>
+      </p:sp>
+      <p:pic>
+        <p:nvPicPr>
+          <p:cNvPr id="4" name="Picture 3">
+            <a:extLst>
+              <a:ext uri="{FF2B5EF4-FFF2-40B4-BE49-F238E27FC236}">
+                <a16:creationId xmlns:a16="http://schemas.microsoft.com/office/drawing/2014/main" id="{46A94657-BCC5-4AD3-BA8B-4DE3FF9F7E30}"/>
+              </a:ext>
+            </a:extLst>
+          </p:cNvPr>
+          <p:cNvPicPr>
+            <a:picLocks noChangeAspect="1"/>
+          </p:cNvPicPr>
+          <p:nvPr/>
+        </p:nvPicPr>
+        <p:blipFill>
+          <a:blip r:embed="rId3"/>
+          <a:stretch>
+            <a:fillRect/>
+          </a:stretch>
+        </p:blipFill>
+        <p:spPr>
+          <a:xfrm>
+            <a:off x="1004887" y="1045803"/>
+            <a:ext cx="10182225" cy="5183399"/>
+          </a:xfrm>
+          <a:prstGeom prst="rect">
+            <a:avLst/>
+          </a:prstGeom>
+        </p:spPr>
+      </p:pic>
+    </p:spTree>
+    <p:extLst>
+      <p:ext uri="{BB962C8B-B14F-4D97-AF65-F5344CB8AC3E}">
+        <p14:creationId xmlns:p14="http://schemas.microsoft.com/office/powerpoint/2010/main" val="3885242857"/>
+      </p:ext>
+    </p:extLst>
+  </p:cSld>
+  <p:clrMapOvr>
+    <a:masterClrMapping/>
+  </p:clrMapOvr>
+  <p:transition spd="med">
+    <p:wipe/>
+  </p:transition>
+</p:sld>
+</file>
+
+<file path=ppt/slides/slide27.xml><?xml version="1.0" encoding="utf-8"?>
+<p:sld xmlns:a="http://schemas.openxmlformats.org/drawingml/2006/main" xmlns:r="http://schemas.openxmlformats.org/officeDocument/2006/relationships" xmlns:p="http://schemas.openxmlformats.org/presentationml/2006/main">
+  <p:cSld>
+    <p:spTree>
+      <p:nvGrpSpPr>
+        <p:cNvPr id="1" name=""/>
+        <p:cNvGrpSpPr/>
+        <p:nvPr/>
+      </p:nvGrpSpPr>
+      <p:grpSpPr>
+        <a:xfrm>
+          <a:off x="0" y="0"/>
+          <a:ext cx="0" cy="0"/>
+          <a:chOff x="0" y="0"/>
+          <a:chExt cx="0" cy="0"/>
+        </a:xfrm>
+      </p:grpSpPr>
+      <p:sp>
+        <p:nvSpPr>
+          <p:cNvPr id="3" name="Title 2"/>
+          <p:cNvSpPr>
+            <a:spLocks noGrp="1"/>
+          </p:cNvSpPr>
+          <p:nvPr>
+            <p:ph type="title"/>
+          </p:nvPr>
+        </p:nvSpPr>
+        <p:spPr/>
+        <p:txBody>
+          <a:bodyPr/>
+          <a:lstStyle/>
+          <a:p>
+            <a:r>
+              <a:rPr lang="en-US" dirty="0"/>
               <a:t>Flash/Program</a:t>
             </a:r>
           </a:p>
@@ -25132,212 +25311,6 @@
 </p:sld>
 </file>
 
-<file path=ppt/slides/slide27.xml><?xml version="1.0" encoding="utf-8"?>
-<p:sld xmlns:a="http://schemas.openxmlformats.org/drawingml/2006/main" xmlns:r="http://schemas.openxmlformats.org/officeDocument/2006/relationships" xmlns:p="http://schemas.openxmlformats.org/presentationml/2006/main">
-  <p:cSld>
-    <p:spTree>
-      <p:nvGrpSpPr>
-        <p:cNvPr id="1" name=""/>
-        <p:cNvGrpSpPr/>
-        <p:nvPr/>
-      </p:nvGrpSpPr>
-      <p:grpSpPr>
-        <a:xfrm>
-          <a:off x="0" y="0"/>
-          <a:ext cx="0" cy="0"/>
-          <a:chOff x="0" y="0"/>
-          <a:chExt cx="0" cy="0"/>
-        </a:xfrm>
-      </p:grpSpPr>
-      <p:sp>
-        <p:nvSpPr>
-          <p:cNvPr id="3" name="Title 2"/>
-          <p:cNvSpPr>
-            <a:spLocks noGrp="1"/>
-          </p:cNvSpPr>
-          <p:nvPr>
-            <p:ph type="title"/>
-          </p:nvPr>
-        </p:nvSpPr>
-        <p:spPr/>
-        <p:txBody>
-          <a:bodyPr/>
-          <a:lstStyle/>
-          <a:p>
-            <a:r>
-              <a:rPr lang="en-US" dirty="0"/>
-              <a:t>Commands</a:t>
-            </a:r>
-          </a:p>
-        </p:txBody>
-      </p:sp>
-      <p:sp>
-        <p:nvSpPr>
-          <p:cNvPr id="5" name="Content Placeholder 4">
-            <a:extLst>
-              <a:ext uri="{FF2B5EF4-FFF2-40B4-BE49-F238E27FC236}">
-                <a16:creationId xmlns:a16="http://schemas.microsoft.com/office/drawing/2014/main" id="{76CEF9E2-781A-4501-9447-AE0C0C250B03}"/>
-              </a:ext>
-            </a:extLst>
-          </p:cNvPr>
-          <p:cNvSpPr>
-            <a:spLocks noGrp="1"/>
-          </p:cNvSpPr>
-          <p:nvPr>
-            <p:ph idx="10"/>
-          </p:nvPr>
-        </p:nvSpPr>
-        <p:spPr/>
-        <p:txBody>
-          <a:bodyPr/>
-          <a:lstStyle/>
-          <a:p>
-            <a:r>
-              <a:rPr lang="en-US" b="1" dirty="0"/>
-              <a:t>plugin network-creator form [useCentralizedSecurity:1] [panId:2] [radioTxPower:1] [channel:1]</a:t>
-            </a:r>
-            <a:endParaRPr lang="en-US" dirty="0"/>
-          </a:p>
-          <a:p>
-            <a:pPr lvl="1"/>
-            <a:r>
-              <a:rPr lang="en-US" i="1" dirty="0"/>
-              <a:t>Form a network with specified parameters.</a:t>
-            </a:r>
-            <a:endParaRPr lang="en-US" dirty="0"/>
-          </a:p>
-          <a:p>
-            <a:pPr lvl="2"/>
-            <a:r>
-              <a:rPr lang="en-US" dirty="0" err="1"/>
-              <a:t>useCentralizedSecurity</a:t>
-            </a:r>
-            <a:r>
-              <a:rPr lang="en-US" dirty="0"/>
-              <a:t> - BOOLEAN - Whether or not to form a centralized network. If this value is false, the device will attempt to join a distributed network.</a:t>
-            </a:r>
-          </a:p>
-          <a:p>
-            <a:pPr lvl="2"/>
-            <a:r>
-              <a:rPr lang="en-US" dirty="0" err="1"/>
-              <a:t>panId</a:t>
-            </a:r>
-            <a:r>
-              <a:rPr lang="en-US" dirty="0"/>
-              <a:t> - INT16U - </a:t>
-            </a:r>
-            <a:r>
-              <a:rPr lang="en-US" dirty="0" err="1"/>
-              <a:t>PanID</a:t>
-            </a:r>
-            <a:r>
-              <a:rPr lang="en-US" dirty="0"/>
-              <a:t> of the network to be formed</a:t>
-            </a:r>
-          </a:p>
-          <a:p>
-            <a:pPr lvl="2"/>
-            <a:r>
-              <a:rPr lang="en-US" dirty="0" err="1"/>
-              <a:t>radioTxPower</a:t>
-            </a:r>
-            <a:r>
-              <a:rPr lang="en-US" dirty="0"/>
-              <a:t> - INT8S - Tx power of the network to be formed</a:t>
-            </a:r>
-          </a:p>
-          <a:p>
-            <a:pPr lvl="2"/>
-            <a:r>
-              <a:rPr lang="en-US" dirty="0"/>
-              <a:t>channel - INT8U - channel of the network to be formed</a:t>
-            </a:r>
-          </a:p>
-          <a:p>
-            <a:pPr lvl="2"/>
-            <a:endParaRPr lang="en-US" dirty="0"/>
-          </a:p>
-          <a:p>
-            <a:r>
-              <a:rPr lang="en-US" b="1" dirty="0"/>
-              <a:t>plugin network-creator-security open-network</a:t>
-            </a:r>
-            <a:endParaRPr lang="en-US" dirty="0"/>
-          </a:p>
-          <a:p>
-            <a:pPr lvl="1"/>
-            <a:r>
-              <a:rPr lang="en-US" i="1" dirty="0"/>
-              <a:t>Open the network for joining.</a:t>
-            </a:r>
-          </a:p>
-          <a:p>
-            <a:pPr lvl="1"/>
-            <a:endParaRPr lang="en-US" dirty="0"/>
-          </a:p>
-          <a:p>
-            <a:r>
-              <a:rPr lang="en-US" b="1" dirty="0"/>
-              <a:t>plugin network-creator-security open-with-key [eui64:8] [</a:t>
-            </a:r>
-            <a:r>
-              <a:rPr lang="en-US" b="1" dirty="0" err="1"/>
-              <a:t>joiningLinkKey</a:t>
-            </a:r>
-            <a:r>
-              <a:rPr lang="en-US" b="1" dirty="0"/>
-              <a:t>:-1]</a:t>
-            </a:r>
-            <a:endParaRPr lang="en-US" dirty="0"/>
-          </a:p>
-          <a:p>
-            <a:pPr lvl="1"/>
-            <a:r>
-              <a:rPr lang="en-US" i="1" dirty="0"/>
-              <a:t>Open the network that would only allow the node with specified EUI and link key pair to join.</a:t>
-            </a:r>
-            <a:endParaRPr lang="en-US" dirty="0"/>
-          </a:p>
-          <a:p>
-            <a:pPr lvl="2"/>
-            <a:r>
-              <a:rPr lang="en-US" dirty="0"/>
-              <a:t>eui64 - IEEE_ADDRESS - The EUI64 of the joining device.</a:t>
-            </a:r>
-          </a:p>
-          <a:p>
-            <a:pPr lvl="2"/>
-            <a:r>
-              <a:rPr lang="en-US" dirty="0" err="1"/>
-              <a:t>joiningLinkKey</a:t>
-            </a:r>
-            <a:r>
-              <a:rPr lang="en-US" dirty="0"/>
-              <a:t> - OCTET_STRING - The link key that the joining device will use to enter the network.</a:t>
-            </a:r>
-          </a:p>
-          <a:p>
-            <a:endParaRPr lang="en-US" dirty="0"/>
-          </a:p>
-        </p:txBody>
-      </p:sp>
-    </p:spTree>
-    <p:extLst>
-      <p:ext uri="{BB962C8B-B14F-4D97-AF65-F5344CB8AC3E}">
-        <p14:creationId xmlns:p14="http://schemas.microsoft.com/office/powerpoint/2010/main" val="4209547546"/>
-      </p:ext>
-    </p:extLst>
-  </p:cSld>
-  <p:clrMapOvr>
-    <a:masterClrMapping/>
-  </p:clrMapOvr>
-  <p:transition spd="med">
-    <p:wipe/>
-  </p:transition>
-</p:sld>
-</file>
-
 <file path=ppt/slides/slide28.xml><?xml version="1.0" encoding="utf-8"?>
 <p:sld xmlns:a="http://schemas.openxmlformats.org/drawingml/2006/main" xmlns:r="http://schemas.openxmlformats.org/officeDocument/2006/relationships" xmlns:p="http://schemas.openxmlformats.org/presentationml/2006/main">
   <p:cSld>
@@ -25372,7 +25345,7 @@
           <a:p>
             <a:r>
               <a:rPr lang="en-US" dirty="0"/>
-              <a:t>Commands</a:t>
+              <a:t>CLI Commands</a:t>
             </a:r>
           </a:p>
         </p:txBody>
@@ -25393,19 +25366,14 @@
             <p:ph idx="10"/>
           </p:nvPr>
         </p:nvSpPr>
-        <p:spPr>
-          <a:xfrm>
-            <a:off x="679450" y="1143000"/>
-            <a:ext cx="10820400" cy="5029200"/>
-          </a:xfrm>
-        </p:spPr>
+        <p:spPr/>
         <p:txBody>
           <a:bodyPr/>
           <a:lstStyle/>
           <a:p>
             <a:r>
               <a:rPr lang="en-US" b="1" dirty="0"/>
-              <a:t>plugin network-steering start [options:1]</a:t>
+              <a:t>plugin network-creator form [useCentralizedSecurity:1] [panId:2] [radioTxPower:1] [channel:1]</a:t>
             </a:r>
             <a:endParaRPr lang="en-US" dirty="0"/>
           </a:p>
@@ -25413,15 +25381,56 @@
             <a:pPr lvl="1"/>
             <a:r>
               <a:rPr lang="en-US" i="1" dirty="0"/>
-              <a:t>Starts the network steering process.</a:t>
+              <a:t>Form a network with specified parameters.</a:t>
             </a:r>
             <a:endParaRPr lang="en-US" dirty="0"/>
           </a:p>
           <a:p>
             <a:pPr lvl="2"/>
             <a:r>
+              <a:rPr lang="en-US" dirty="0" err="1"/>
+              <a:t>useCentralizedSecurity</a:t>
+            </a:r>
+            <a:r>
               <a:rPr lang="en-US" dirty="0"/>
-              <a:t>options - INT8U - A mask of options for indicating specific behavior within the network-steering process.</a:t>
+              <a:t> - BOOLEAN - Whether or not to form a centralized network. If this value is false, the device will attempt to join a distributed network.</a:t>
+            </a:r>
+          </a:p>
+          <a:p>
+            <a:pPr lvl="2"/>
+            <a:r>
+              <a:rPr lang="en-US" dirty="0" err="1"/>
+              <a:t>panId</a:t>
+            </a:r>
+            <a:r>
+              <a:rPr lang="en-US" dirty="0"/>
+              <a:t> - INT16U - </a:t>
+            </a:r>
+            <a:r>
+              <a:rPr lang="en-US" dirty="0" err="1"/>
+              <a:t>PanID</a:t>
+            </a:r>
+            <a:r>
+              <a:rPr lang="en-US" dirty="0"/>
+              <a:t> of the network to be formed</a:t>
+            </a:r>
+          </a:p>
+          <a:p>
+            <a:pPr lvl="2"/>
+            <a:r>
+              <a:rPr lang="en-US" dirty="0" err="1"/>
+              <a:t>radioTxPower</a:t>
+            </a:r>
+            <a:r>
+              <a:rPr lang="en-US" dirty="0"/>
+              <a:t> - INT8S - Tx power of the network to be formed</a:t>
+            </a:r>
+          </a:p>
+          <a:p>
+            <a:pPr lvl="2"/>
+            <a:r>
+              <a:rPr lang="en-US" dirty="0"/>
+              <a:t>channel - INT8U - channel of the network to be formed</a:t>
             </a:r>
           </a:p>
           <a:p>
@@ -25430,21 +25439,34 @@
           </a:p>
           <a:p>
             <a:r>
+              <a:rPr lang="en-US" b="1" dirty="0"/>
+              <a:t>plugin network-creator-security open-network</a:t>
+            </a:r>
+            <a:endParaRPr lang="en-US" dirty="0"/>
+          </a:p>
+          <a:p>
+            <a:pPr lvl="1"/>
+            <a:r>
+              <a:rPr lang="en-US" i="1" dirty="0"/>
+              <a:t>Open the network for joining.</a:t>
+            </a:r>
+          </a:p>
+          <a:p>
+            <a:pPr lvl="1"/>
+            <a:endParaRPr lang="en-US" dirty="0"/>
+          </a:p>
+          <a:p>
+            <a:r>
+              <a:rPr lang="en-US" b="1" dirty="0"/>
+              <a:t>plugin network-creator-security open-with-key [eui64:8] [</a:t>
+            </a:r>
+            <a:r>
               <a:rPr lang="en-US" b="1" dirty="0" err="1"/>
-              <a:t>zcl</a:t>
+              <a:t>joiningLinkKey</a:t>
             </a:r>
             <a:r>
               <a:rPr lang="en-US" b="1" dirty="0"/>
-              <a:t> on-off toggle</a:t>
-            </a:r>
-          </a:p>
-          <a:p>
-            <a:endParaRPr lang="en-US" b="1" dirty="0"/>
-          </a:p>
-          <a:p>
-            <a:r>
-              <a:rPr lang="en-US" b="1" dirty="0"/>
-              <a:t>send [id:2] [src-endpoint:1] [dst-endpoint:1]</a:t>
+              <a:t>:-1]</a:t>
             </a:r>
             <a:endParaRPr lang="en-US" dirty="0"/>
           </a:p>
@@ -25452,7 +25474,7 @@
             <a:pPr lvl="1"/>
             <a:r>
               <a:rPr lang="en-US" i="1" dirty="0"/>
-              <a:t>Send a pre-buffered message from a given endpoint to an endpoint on a device with a given short address.</a:t>
+              <a:t>Open the network that would only allow the node with specified EUI and link key pair to join.</a:t>
             </a:r>
             <a:endParaRPr lang="en-US" dirty="0"/>
           </a:p>
@@ -25460,29 +25482,18 @@
             <a:pPr lvl="2"/>
             <a:r>
               <a:rPr lang="en-US" dirty="0"/>
-              <a:t>id - INT16U - short id of the device to send the message to</a:t>
+              <a:t>eui64 - IEEE_ADDRESS - The EUI64 of the joining device.</a:t>
             </a:r>
           </a:p>
           <a:p>
             <a:pPr lvl="2"/>
             <a:r>
               <a:rPr lang="en-US" dirty="0" err="1"/>
-              <a:t>src</a:t>
+              <a:t>joiningLinkKey</a:t>
             </a:r>
             <a:r>
               <a:rPr lang="en-US" dirty="0"/>
-              <a:t>-endpoint - INT8U - The endpoint to send the message from</a:t>
-            </a:r>
-          </a:p>
-          <a:p>
-            <a:pPr lvl="2"/>
-            <a:r>
-              <a:rPr lang="en-US" dirty="0" err="1"/>
-              <a:t>dst</a:t>
-            </a:r>
-            <a:r>
-              <a:rPr lang="en-US" dirty="0"/>
-              <a:t>-endpoint - INT8U - The endpoint to send the message to</a:t>
+              <a:t> - OCTET_STRING - The link key that the joining device will use to enter the network.</a:t>
             </a:r>
           </a:p>
           <a:p>
@@ -25493,7 +25504,7 @@
     </p:spTree>
     <p:extLst>
       <p:ext uri="{BB962C8B-B14F-4D97-AF65-F5344CB8AC3E}">
-        <p14:creationId xmlns:p14="http://schemas.microsoft.com/office/powerpoint/2010/main" val="1366958089"/>
+        <p14:creationId xmlns:p14="http://schemas.microsoft.com/office/powerpoint/2010/main" val="4209547546"/>
       </p:ext>
     </p:extLst>
   </p:cSld>
@@ -25540,7 +25551,7 @@
           <a:p>
             <a:r>
               <a:rPr lang="en-US" dirty="0"/>
-              <a:t>Debug</a:t>
+              <a:t>CLI Commands</a:t>
             </a:r>
           </a:p>
         </p:txBody>
@@ -25561,84 +25572,99 @@
             <p:ph idx="10"/>
           </p:nvPr>
         </p:nvSpPr>
-        <p:spPr/>
+        <p:spPr>
+          <a:xfrm>
+            <a:off x="679450" y="1143000"/>
+            <a:ext cx="10820400" cy="5029200"/>
+          </a:xfrm>
+        </p:spPr>
         <p:txBody>
           <a:bodyPr/>
           <a:lstStyle/>
           <a:p>
             <a:r>
+              <a:rPr lang="en-US" b="1" dirty="0"/>
+              <a:t>plugin network-steering start [options:1]</a:t>
+            </a:r>
+            <a:endParaRPr lang="en-US" dirty="0"/>
+          </a:p>
+          <a:p>
+            <a:pPr lvl="1"/>
+            <a:r>
+              <a:rPr lang="en-US" i="1" dirty="0"/>
+              <a:t>Starts the network steering process.</a:t>
+            </a:r>
+            <a:endParaRPr lang="en-US" dirty="0"/>
+          </a:p>
+          <a:p>
+            <a:pPr lvl="2"/>
+            <a:r>
+              <a:rPr lang="en-US" dirty="0"/>
+              <a:t>options - INT8U - A mask of options for indicating specific behavior within the network-steering process.</a:t>
+            </a:r>
+          </a:p>
+          <a:p>
+            <a:pPr lvl="2"/>
+            <a:endParaRPr lang="en-US" dirty="0"/>
+          </a:p>
+          <a:p>
+            <a:r>
               <a:rPr lang="en-US" b="1" dirty="0" err="1"/>
-              <a:t>emberAfCorePrint</a:t>
+              <a:t>zcl</a:t>
             </a:r>
             <a:r>
               <a:rPr lang="en-US" b="1" dirty="0"/>
-              <a:t>(…) </a:t>
-            </a:r>
+              <a:t> on-off toggle</a:t>
+            </a:r>
+          </a:p>
+          <a:p>
+            <a:endParaRPr lang="en-US" b="1" dirty="0"/>
+          </a:p>
+          <a:p>
+            <a:r>
+              <a:rPr lang="en-US" b="1" dirty="0"/>
+              <a:t>send [id:2] [src-endpoint:1] [dst-endpoint:1]</a:t>
+            </a:r>
+            <a:endParaRPr lang="en-US" dirty="0"/>
+          </a:p>
+          <a:p>
+            <a:pPr lvl="1"/>
+            <a:r>
+              <a:rPr lang="en-US" i="1" dirty="0"/>
+              <a:t>Send a pre-buffered message from a given endpoint to an endpoint on a device with a given short address.</a:t>
+            </a:r>
+            <a:endParaRPr lang="en-US" dirty="0"/>
+          </a:p>
+          <a:p>
+            <a:pPr lvl="2"/>
             <a:r>
               <a:rPr lang="en-US" dirty="0"/>
-              <a:t>- prints a single line without a carriage return </a:t>
-            </a:r>
-          </a:p>
-          <a:p>
-            <a:r>
-              <a:rPr lang="en-US" b="1" dirty="0" err="1"/>
-              <a:t>emberAfCorePrintln</a:t>
-            </a:r>
-            <a:r>
-              <a:rPr lang="en-US" b="1" dirty="0"/>
-              <a:t>(…) </a:t>
+              <a:t>id - INT16U - short id of the device to send the message to</a:t>
+            </a:r>
+          </a:p>
+          <a:p>
+            <a:pPr lvl="2"/>
+            <a:r>
+              <a:rPr lang="en-US" dirty="0" err="1"/>
+              <a:t>src</a:t>
             </a:r>
             <a:r>
               <a:rPr lang="en-US" dirty="0"/>
-              <a:t>- prints a single line with a carriage return </a:t>
-            </a:r>
-          </a:p>
-          <a:p>
-            <a:r>
-              <a:rPr lang="en-US" b="1" dirty="0" err="1"/>
-              <a:t>emberAfCorePrintBuffer</a:t>
-            </a:r>
-            <a:r>
-              <a:rPr lang="en-US" b="1" dirty="0"/>
-              <a:t>( buffer, </a:t>
-            </a:r>
-            <a:r>
-              <a:rPr lang="en-US" b="1" dirty="0" err="1"/>
-              <a:t>len</a:t>
-            </a:r>
-            <a:r>
-              <a:rPr lang="en-US" b="1" dirty="0"/>
-              <a:t>, </a:t>
-            </a:r>
-            <a:r>
-              <a:rPr lang="en-US" b="1" dirty="0" err="1"/>
-              <a:t>withspace</a:t>
-            </a:r>
-            <a:r>
-              <a:rPr lang="en-US" b="1" dirty="0"/>
-              <a:t> ) </a:t>
+              <a:t>-endpoint - INT8U - The endpoint to send the message from</a:t>
+            </a:r>
+          </a:p>
+          <a:p>
+            <a:pPr lvl="2"/>
+            <a:r>
+              <a:rPr lang="en-US" dirty="0" err="1"/>
+              <a:t>dst</a:t>
             </a:r>
             <a:r>
               <a:rPr lang="en-US" dirty="0"/>
-              <a:t>– prints a given buffer as a series of hex values </a:t>
-            </a:r>
-          </a:p>
-          <a:p>
-            <a:r>
-              <a:rPr lang="en-US" b="1" dirty="0" err="1"/>
-              <a:t>emberAfCorePrintString</a:t>
-            </a:r>
-            <a:r>
-              <a:rPr lang="en-US" b="1" dirty="0"/>
-              <a:t>( buffer ) </a:t>
-            </a:r>
-            <a:r>
-              <a:rPr lang="en-US" dirty="0"/>
-              <a:t>– prints a given buffer as a string of characters </a:t>
-            </a:r>
-            <a:br>
-              <a:rPr lang="en-US" dirty="0"/>
-            </a:br>
+              <a:t>-endpoint - INT8U - The endpoint to send the message to</a:t>
+            </a:r>
+          </a:p>
+          <a:p>
             <a:endParaRPr lang="en-US" dirty="0"/>
           </a:p>
         </p:txBody>
@@ -25646,7 +25672,7 @@
     </p:spTree>
     <p:extLst>
       <p:ext uri="{BB962C8B-B14F-4D97-AF65-F5344CB8AC3E}">
-        <p14:creationId xmlns:p14="http://schemas.microsoft.com/office/powerpoint/2010/main" val="3000147220"/>
+        <p14:creationId xmlns:p14="http://schemas.microsoft.com/office/powerpoint/2010/main" val="1366958089"/>
       </p:ext>
     </p:extLst>
   </p:cSld>
@@ -25925,6 +25951,114 @@
           </a:prstGeom>
         </p:spPr>
       </p:pic>
+      <p:sp>
+        <p:nvSpPr>
+          <p:cNvPr id="11" name="Rectangle 10">
+            <a:extLst>
+              <a:ext uri="{FF2B5EF4-FFF2-40B4-BE49-F238E27FC236}">
+                <a16:creationId xmlns:a16="http://schemas.microsoft.com/office/drawing/2014/main" id="{E585C2E2-CA52-4951-9EF5-BE9FF707751C}"/>
+              </a:ext>
+            </a:extLst>
+          </p:cNvPr>
+          <p:cNvSpPr/>
+          <p:nvPr/>
+        </p:nvSpPr>
+        <p:spPr>
+          <a:xfrm>
+            <a:off x="3999081" y="1749197"/>
+            <a:ext cx="3002055" cy="3200400"/>
+          </a:xfrm>
+          <a:prstGeom prst="rect">
+            <a:avLst/>
+          </a:prstGeom>
+          <a:solidFill>
+            <a:schemeClr val="bg1">
+              <a:alpha val="60000"/>
+            </a:schemeClr>
+          </a:solidFill>
+          <a:ln>
+            <a:noFill/>
+          </a:ln>
+        </p:spPr>
+        <p:style>
+          <a:lnRef idx="2">
+            <a:schemeClr val="accent1">
+              <a:shade val="50000"/>
+            </a:schemeClr>
+          </a:lnRef>
+          <a:fillRef idx="1">
+            <a:schemeClr val="accent1"/>
+          </a:fillRef>
+          <a:effectRef idx="0">
+            <a:schemeClr val="accent1"/>
+          </a:effectRef>
+          <a:fontRef idx="minor">
+            <a:schemeClr val="lt1"/>
+          </a:fontRef>
+        </p:style>
+        <p:txBody>
+          <a:bodyPr rtlCol="0" anchor="ctr"/>
+          <a:lstStyle/>
+          <a:p>
+            <a:pPr algn="ctr"/>
+            <a:endParaRPr lang="en-US"/>
+          </a:p>
+        </p:txBody>
+      </p:sp>
+      <p:sp>
+        <p:nvSpPr>
+          <p:cNvPr id="12" name="Rectangle 11">
+            <a:extLst>
+              <a:ext uri="{FF2B5EF4-FFF2-40B4-BE49-F238E27FC236}">
+                <a16:creationId xmlns:a16="http://schemas.microsoft.com/office/drawing/2014/main" id="{D90D8818-4290-46B7-AF12-577BF93AA505}"/>
+              </a:ext>
+            </a:extLst>
+          </p:cNvPr>
+          <p:cNvSpPr/>
+          <p:nvPr/>
+        </p:nvSpPr>
+        <p:spPr>
+          <a:xfrm>
+            <a:off x="7620749" y="1749197"/>
+            <a:ext cx="3885450" cy="3200400"/>
+          </a:xfrm>
+          <a:prstGeom prst="rect">
+            <a:avLst/>
+          </a:prstGeom>
+          <a:solidFill>
+            <a:schemeClr val="bg1">
+              <a:alpha val="60000"/>
+            </a:schemeClr>
+          </a:solidFill>
+          <a:ln>
+            <a:noFill/>
+          </a:ln>
+        </p:spPr>
+        <p:style>
+          <a:lnRef idx="2">
+            <a:schemeClr val="accent1">
+              <a:shade val="50000"/>
+            </a:schemeClr>
+          </a:lnRef>
+          <a:fillRef idx="1">
+            <a:schemeClr val="accent1"/>
+          </a:fillRef>
+          <a:effectRef idx="0">
+            <a:schemeClr val="accent1"/>
+          </a:effectRef>
+          <a:fontRef idx="minor">
+            <a:schemeClr val="lt1"/>
+          </a:fontRef>
+        </p:style>
+        <p:txBody>
+          <a:bodyPr rtlCol="0" anchor="ctr"/>
+          <a:lstStyle/>
+          <a:p>
+            <a:pPr algn="ctr"/>
+            <a:endParaRPr lang="en-US"/>
+          </a:p>
+        </p:txBody>
+      </p:sp>
     </p:spTree>
     <p:extLst>
       <p:ext uri="{BB962C8B-B14F-4D97-AF65-F5344CB8AC3E}">
@@ -25942,6 +26076,159 @@
 </file>
 
 <file path=ppt/slides/slide30.xml><?xml version="1.0" encoding="utf-8"?>
+<p:sld xmlns:a="http://schemas.openxmlformats.org/drawingml/2006/main" xmlns:r="http://schemas.openxmlformats.org/officeDocument/2006/relationships" xmlns:p="http://schemas.openxmlformats.org/presentationml/2006/main">
+  <p:cSld>
+    <p:spTree>
+      <p:nvGrpSpPr>
+        <p:cNvPr id="1" name=""/>
+        <p:cNvGrpSpPr/>
+        <p:nvPr/>
+      </p:nvGrpSpPr>
+      <p:grpSpPr>
+        <a:xfrm>
+          <a:off x="0" y="0"/>
+          <a:ext cx="0" cy="0"/>
+          <a:chOff x="0" y="0"/>
+          <a:chExt cx="0" cy="0"/>
+        </a:xfrm>
+      </p:grpSpPr>
+      <p:sp>
+        <p:nvSpPr>
+          <p:cNvPr id="3" name="Title 2"/>
+          <p:cNvSpPr>
+            <a:spLocks noGrp="1"/>
+          </p:cNvSpPr>
+          <p:nvPr>
+            <p:ph type="title"/>
+          </p:nvPr>
+        </p:nvSpPr>
+        <p:spPr/>
+        <p:txBody>
+          <a:bodyPr/>
+          <a:lstStyle/>
+          <a:p>
+            <a:r>
+              <a:rPr lang="en-US" dirty="0"/>
+              <a:t>Debug</a:t>
+            </a:r>
+          </a:p>
+        </p:txBody>
+      </p:sp>
+      <p:sp>
+        <p:nvSpPr>
+          <p:cNvPr id="5" name="Content Placeholder 4">
+            <a:extLst>
+              <a:ext uri="{FF2B5EF4-FFF2-40B4-BE49-F238E27FC236}">
+                <a16:creationId xmlns:a16="http://schemas.microsoft.com/office/drawing/2014/main" id="{76CEF9E2-781A-4501-9447-AE0C0C250B03}"/>
+              </a:ext>
+            </a:extLst>
+          </p:cNvPr>
+          <p:cNvSpPr>
+            <a:spLocks noGrp="1"/>
+          </p:cNvSpPr>
+          <p:nvPr>
+            <p:ph idx="10"/>
+          </p:nvPr>
+        </p:nvSpPr>
+        <p:spPr/>
+        <p:txBody>
+          <a:bodyPr/>
+          <a:lstStyle/>
+          <a:p>
+            <a:r>
+              <a:rPr lang="en-US" b="1" dirty="0" err="1"/>
+              <a:t>emberAfCorePrint</a:t>
+            </a:r>
+            <a:r>
+              <a:rPr lang="en-US" b="1" dirty="0"/>
+              <a:t>(…) </a:t>
+            </a:r>
+            <a:r>
+              <a:rPr lang="en-US" dirty="0"/>
+              <a:t>- prints a single line without a carriage return </a:t>
+            </a:r>
+          </a:p>
+          <a:p>
+            <a:r>
+              <a:rPr lang="en-US" b="1" dirty="0" err="1"/>
+              <a:t>emberAfCorePrintln</a:t>
+            </a:r>
+            <a:r>
+              <a:rPr lang="en-US" b="1" dirty="0"/>
+              <a:t>(…) </a:t>
+            </a:r>
+            <a:r>
+              <a:rPr lang="en-US" dirty="0"/>
+              <a:t>- prints a single line with a carriage return </a:t>
+            </a:r>
+          </a:p>
+          <a:p>
+            <a:r>
+              <a:rPr lang="en-US" b="1" dirty="0" err="1"/>
+              <a:t>emberAfCorePrintBuffer</a:t>
+            </a:r>
+            <a:r>
+              <a:rPr lang="en-US" b="1" dirty="0"/>
+              <a:t>( buffer, </a:t>
+            </a:r>
+            <a:r>
+              <a:rPr lang="en-US" b="1" dirty="0" err="1"/>
+              <a:t>len</a:t>
+            </a:r>
+            <a:r>
+              <a:rPr lang="en-US" b="1" dirty="0"/>
+              <a:t>, </a:t>
+            </a:r>
+            <a:r>
+              <a:rPr lang="en-US" b="1" dirty="0" err="1"/>
+              <a:t>withspace</a:t>
+            </a:r>
+            <a:r>
+              <a:rPr lang="en-US" b="1" dirty="0"/>
+              <a:t> ) </a:t>
+            </a:r>
+            <a:r>
+              <a:rPr lang="en-US" dirty="0"/>
+              <a:t>– prints a given buffer as a series of hex values </a:t>
+            </a:r>
+          </a:p>
+          <a:p>
+            <a:r>
+              <a:rPr lang="en-US" b="1" dirty="0" err="1"/>
+              <a:t>emberAfCorePrintString</a:t>
+            </a:r>
+            <a:r>
+              <a:rPr lang="en-US" b="1" dirty="0"/>
+              <a:t>( buffer ) </a:t>
+            </a:r>
+            <a:r>
+              <a:rPr lang="en-US" dirty="0"/>
+              <a:t>– prints a given buffer as a string of characters </a:t>
+            </a:r>
+            <a:br>
+              <a:rPr lang="en-US" dirty="0"/>
+            </a:br>
+            <a:endParaRPr lang="en-US" dirty="0"/>
+          </a:p>
+        </p:txBody>
+      </p:sp>
+    </p:spTree>
+    <p:extLst>
+      <p:ext uri="{BB962C8B-B14F-4D97-AF65-F5344CB8AC3E}">
+        <p14:creationId xmlns:p14="http://schemas.microsoft.com/office/powerpoint/2010/main" val="3000147220"/>
+      </p:ext>
+    </p:extLst>
+  </p:cSld>
+  <p:clrMapOvr>
+    <a:masterClrMapping/>
+  </p:clrMapOvr>
+  <p:transition spd="med">
+    <p:wipe/>
+  </p:transition>
+</p:sld>
+</file>
+
+<file path=ppt/slides/slide31.xml><?xml version="1.0" encoding="utf-8"?>
 <p:sld xmlns:a="http://schemas.openxmlformats.org/drawingml/2006/main" xmlns:r="http://schemas.openxmlformats.org/officeDocument/2006/relationships" xmlns:p="http://schemas.openxmlformats.org/presentationml/2006/main">
   <p:cSld>
     <p:spTree>
@@ -26102,7 +26389,7 @@
 </p:sld>
 </file>
 
-<file path=ppt/slides/slide31.xml><?xml version="1.0" encoding="utf-8"?>
+<file path=ppt/slides/slide32.xml><?xml version="1.0" encoding="utf-8"?>
 <p:sld xmlns:a="http://schemas.openxmlformats.org/drawingml/2006/main" xmlns:r="http://schemas.openxmlformats.org/officeDocument/2006/relationships" xmlns:p="http://schemas.openxmlformats.org/presentationml/2006/main">
   <p:cSld>
     <p:spTree>
@@ -45356,6 +45643,21 @@
 </file>
 
 <file path=customXml/item1.xml><?xml version="1.0" encoding="utf-8"?>
+<p:properties xmlns:p="http://schemas.microsoft.com/office/2006/metadata/properties" xmlns:xsi="http://www.w3.org/2001/XMLSchema-instance" xmlns:pc="http://schemas.microsoft.com/office/infopath/2007/PartnerControls">
+  <documentManagement/>
+</p:properties>
+</file>
+
+<file path=customXml/item2.xml><?xml version="1.0" encoding="utf-8"?>
+<?mso-contentType ?>
+<FormTemplates xmlns="http://schemas.microsoft.com/sharepoint/v3/contenttype/forms">
+  <Display>DocumentLibraryForm</Display>
+  <Edit>DocumentLibraryForm</Edit>
+  <New>DocumentLibraryForm</New>
+</FormTemplates>
+</file>
+
+<file path=customXml/item3.xml><?xml version="1.0" encoding="utf-8"?>
 <ct:contentTypeSchema xmlns:ct="http://schemas.microsoft.com/office/2006/metadata/contentType" xmlns:ma="http://schemas.microsoft.com/office/2006/metadata/properties/metaAttributes" ct:_="" ma:_="" ma:contentTypeName="Document" ma:contentTypeID="0x010100B21F7AB2AB09B744870FD2BB34F58D4C" ma:contentTypeVersion="0" ma:contentTypeDescription="Create a new document." ma:contentTypeScope="" ma:versionID="610a13794e9c15d6bc8a774371eef038">
   <xsd:schema xmlns:xsd="http://www.w3.org/2001/XMLSchema" xmlns:xs="http://www.w3.org/2001/XMLSchema" xmlns:p="http://schemas.microsoft.com/office/2006/metadata/properties" targetNamespace="http://schemas.microsoft.com/office/2006/metadata/properties" ma:root="true" ma:fieldsID="1b05d82d297216baf5b26c55225140df">
     <xsd:element name="properties">
@@ -45469,22 +45771,30 @@
 </ct:contentTypeSchema>
 </file>
 
-<file path=customXml/item2.xml><?xml version="1.0" encoding="utf-8"?>
-<?mso-contentType ?>
-<FormTemplates xmlns="http://schemas.microsoft.com/sharepoint/v3/contenttype/forms">
-  <Display>DocumentLibraryForm</Display>
-  <Edit>DocumentLibraryForm</Edit>
-  <New>DocumentLibraryForm</New>
-</FormTemplates>
+<file path=customXml/itemProps1.xml><?xml version="1.0" encoding="utf-8"?>
+<ds:datastoreItem xmlns:ds="http://schemas.openxmlformats.org/officeDocument/2006/customXml" ds:itemID="{88E5C257-99A9-40B2-A1DE-0EB62604DA9C}">
+  <ds:schemaRefs>
+    <ds:schemaRef ds:uri="http://purl.org/dc/terms/"/>
+    <ds:schemaRef ds:uri="http://schemas.openxmlformats.org/package/2006/metadata/core-properties"/>
+    <ds:schemaRef ds:uri="http://schemas.microsoft.com/office/2006/documentManagement/types"/>
+    <ds:schemaRef ds:uri="http://schemas.microsoft.com/office/infopath/2007/PartnerControls"/>
+    <ds:schemaRef ds:uri="http://purl.org/dc/elements/1.1/"/>
+    <ds:schemaRef ds:uri="http://schemas.microsoft.com/office/2006/metadata/properties"/>
+    <ds:schemaRef ds:uri="http://www.w3.org/XML/1998/namespace"/>
+    <ds:schemaRef ds:uri="http://purl.org/dc/dcmitype/"/>
+  </ds:schemaRefs>
+</ds:datastoreItem>
 </file>
 
-<file path=customXml/item3.xml><?xml version="1.0" encoding="utf-8"?>
-<p:properties xmlns:p="http://schemas.microsoft.com/office/2006/metadata/properties" xmlns:xsi="http://www.w3.org/2001/XMLSchema-instance" xmlns:pc="http://schemas.microsoft.com/office/infopath/2007/PartnerControls">
-  <documentManagement/>
-</p:properties>
+<file path=customXml/itemProps2.xml><?xml version="1.0" encoding="utf-8"?>
+<ds:datastoreItem xmlns:ds="http://schemas.openxmlformats.org/officeDocument/2006/customXml" ds:itemID="{4DD62670-B0F9-4782-967B-54D0F2A11DD3}">
+  <ds:schemaRefs>
+    <ds:schemaRef ds:uri="http://schemas.microsoft.com/sharepoint/v3/contenttype/forms"/>
+  </ds:schemaRefs>
+</ds:datastoreItem>
 </file>
 
-<file path=customXml/itemProps1.xml><?xml version="1.0" encoding="utf-8"?>
+<file path=customXml/itemProps3.xml><?xml version="1.0" encoding="utf-8"?>
 <ds:datastoreItem xmlns:ds="http://schemas.openxmlformats.org/officeDocument/2006/customXml" ds:itemID="{59925F4A-05CC-4D19-A5F3-6B37E808F6A7}">
   <ds:schemaRefs>
     <ds:schemaRef ds:uri="http://schemas.microsoft.com/office/2006/metadata/contentType"/>
@@ -45498,27 +45808,4 @@
     <ds:schemaRef ds:uri="http://schemas.microsoft.com/office/infopath/2007/PartnerControls"/>
   </ds:schemaRefs>
 </ds:datastoreItem>
-</file>
-
-<file path=customXml/itemProps2.xml><?xml version="1.0" encoding="utf-8"?>
-<ds:datastoreItem xmlns:ds="http://schemas.openxmlformats.org/officeDocument/2006/customXml" ds:itemID="{4DD62670-B0F9-4782-967B-54D0F2A11DD3}">
-  <ds:schemaRefs>
-    <ds:schemaRef ds:uri="http://schemas.microsoft.com/sharepoint/v3/contenttype/forms"/>
-  </ds:schemaRefs>
-</ds:datastoreItem>
-</file>
-
-<file path=customXml/itemProps3.xml><?xml version="1.0" encoding="utf-8"?>
-<ds:datastoreItem xmlns:ds="http://schemas.openxmlformats.org/officeDocument/2006/customXml" ds:itemID="{88E5C257-99A9-40B2-A1DE-0EB62604DA9C}">
-  <ds:schemaRefs>
-    <ds:schemaRef ds:uri="http://purl.org/dc/terms/"/>
-    <ds:schemaRef ds:uri="http://schemas.openxmlformats.org/package/2006/metadata/core-properties"/>
-    <ds:schemaRef ds:uri="http://schemas.microsoft.com/office/2006/documentManagement/types"/>
-    <ds:schemaRef ds:uri="http://schemas.microsoft.com/office/infopath/2007/PartnerControls"/>
-    <ds:schemaRef ds:uri="http://purl.org/dc/elements/1.1/"/>
-    <ds:schemaRef ds:uri="http://schemas.microsoft.com/office/2006/metadata/properties"/>
-    <ds:schemaRef ds:uri="http://www.w3.org/XML/1998/namespace"/>
-    <ds:schemaRef ds:uri="http://purl.org/dc/dcmitype/"/>
-  </ds:schemaRefs>
-</ds:datastoreItem>
 </file>
</xml_diff>

<commit_message>
[DOC]Improve doc according to the comments
</commit_message>
<xml_diff>
--- a/zigbee/EmberZnet and WSTK.pptx
+++ b/zigbee/EmberZnet and WSTK.pptx
@@ -248,7 +248,7 @@
           <a:p>
             <a:fld id="{3CAB3C29-341D-6743-A203-2F7086D57830}" type="datetimeFigureOut">
               <a:rPr lang="en-US" smtClean="0"/>
-              <a:t>2019-11-25</a:t>
+              <a:t>2019-12-08</a:t>
             </a:fld>
             <a:endParaRPr lang="en-US"/>
           </a:p>
@@ -24247,7 +24247,7 @@
           <p:nvPr>
             <p:extLst>
               <p:ext uri="{D42A27DB-BD31-4B8C-83A1-F6EECF244321}">
-                <p14:modId xmlns:p14="http://schemas.microsoft.com/office/powerpoint/2010/main" val="2691451058"/>
+                <p14:modId xmlns:p14="http://schemas.microsoft.com/office/powerpoint/2010/main" val="3056383326"/>
               </p:ext>
             </p:extLst>
           </p:nvPr>
@@ -24475,10 +24475,34 @@
                     <a:lstStyle/>
                     <a:p>
                       <a:r>
-                        <a:rPr lang="en-US" dirty="0" err="1"/>
+                        <a:rPr lang="en-US" dirty="0" err="1">
+                          <a:solidFill>
+                            <a:srgbClr val="FF0000"/>
+                          </a:solidFill>
+                        </a:rPr>
                         <a:t>znet-cli.c</a:t>
                       </a:r>
-                      <a:endParaRPr lang="en-US" dirty="0"/>
+                      <a:r>
+                        <a:rPr lang="en-US" dirty="0">
+                          <a:solidFill>
+                            <a:srgbClr val="FF0000"/>
+                          </a:solidFill>
+                        </a:rPr>
+                        <a:t>/</a:t>
+                      </a:r>
+                      <a:r>
+                        <a:rPr lang="en-US" dirty="0" err="1">
+                          <a:solidFill>
+                            <a:srgbClr val="FF0000"/>
+                          </a:solidFill>
+                        </a:rPr>
+                        <a:t>znet-cli.h</a:t>
+                      </a:r>
+                      <a:endParaRPr lang="en-US" dirty="0">
+                        <a:solidFill>
+                          <a:srgbClr val="FF0000"/>
+                        </a:solidFill>
+                      </a:endParaRPr>
                     </a:p>
                   </a:txBody>
                   <a:tcPr/>
@@ -24489,7 +24513,11 @@
                     <a:lstStyle/>
                     <a:p>
                       <a:r>
-                        <a:rPr lang="en-US" dirty="0"/>
+                        <a:rPr lang="en-US" dirty="0">
+                          <a:solidFill>
+                            <a:srgbClr val="FF0000"/>
+                          </a:solidFill>
+                        </a:rPr>
                         <a:t>CLI command list</a:t>
                       </a:r>
                     </a:p>
@@ -45643,21 +45671,6 @@
 </file>
 
 <file path=customXml/item1.xml><?xml version="1.0" encoding="utf-8"?>
-<p:properties xmlns:p="http://schemas.microsoft.com/office/2006/metadata/properties" xmlns:xsi="http://www.w3.org/2001/XMLSchema-instance" xmlns:pc="http://schemas.microsoft.com/office/infopath/2007/PartnerControls">
-  <documentManagement/>
-</p:properties>
-</file>
-
-<file path=customXml/item2.xml><?xml version="1.0" encoding="utf-8"?>
-<?mso-contentType ?>
-<FormTemplates xmlns="http://schemas.microsoft.com/sharepoint/v3/contenttype/forms">
-  <Display>DocumentLibraryForm</Display>
-  <Edit>DocumentLibraryForm</Edit>
-  <New>DocumentLibraryForm</New>
-</FormTemplates>
-</file>
-
-<file path=customXml/item3.xml><?xml version="1.0" encoding="utf-8"?>
 <ct:contentTypeSchema xmlns:ct="http://schemas.microsoft.com/office/2006/metadata/contentType" xmlns:ma="http://schemas.microsoft.com/office/2006/metadata/properties/metaAttributes" ct:_="" ma:_="" ma:contentTypeName="Document" ma:contentTypeID="0x010100B21F7AB2AB09B744870FD2BB34F58D4C" ma:contentTypeVersion="0" ma:contentTypeDescription="Create a new document." ma:contentTypeScope="" ma:versionID="610a13794e9c15d6bc8a774371eef038">
   <xsd:schema xmlns:xsd="http://www.w3.org/2001/XMLSchema" xmlns:xs="http://www.w3.org/2001/XMLSchema" xmlns:p="http://schemas.microsoft.com/office/2006/metadata/properties" targetNamespace="http://schemas.microsoft.com/office/2006/metadata/properties" ma:root="true" ma:fieldsID="1b05d82d297216baf5b26c55225140df">
     <xsd:element name="properties">
@@ -45771,17 +45784,33 @@
 </ct:contentTypeSchema>
 </file>
 
+<file path=customXml/item2.xml><?xml version="1.0" encoding="utf-8"?>
+<?mso-contentType ?>
+<FormTemplates xmlns="http://schemas.microsoft.com/sharepoint/v3/contenttype/forms">
+  <Display>DocumentLibraryForm</Display>
+  <Edit>DocumentLibraryForm</Edit>
+  <New>DocumentLibraryForm</New>
+</FormTemplates>
+</file>
+
+<file path=customXml/item3.xml><?xml version="1.0" encoding="utf-8"?>
+<p:properties xmlns:p="http://schemas.microsoft.com/office/2006/metadata/properties" xmlns:xsi="http://www.w3.org/2001/XMLSchema-instance" xmlns:pc="http://schemas.microsoft.com/office/infopath/2007/PartnerControls">
+  <documentManagement/>
+</p:properties>
+</file>
+
 <file path=customXml/itemProps1.xml><?xml version="1.0" encoding="utf-8"?>
-<ds:datastoreItem xmlns:ds="http://schemas.openxmlformats.org/officeDocument/2006/customXml" ds:itemID="{88E5C257-99A9-40B2-A1DE-0EB62604DA9C}">
+<ds:datastoreItem xmlns:ds="http://schemas.openxmlformats.org/officeDocument/2006/customXml" ds:itemID="{59925F4A-05CC-4D19-A5F3-6B37E808F6A7}">
   <ds:schemaRefs>
+    <ds:schemaRef ds:uri="http://schemas.microsoft.com/office/2006/metadata/contentType"/>
+    <ds:schemaRef ds:uri="http://schemas.microsoft.com/office/2006/metadata/properties/metaAttributes"/>
+    <ds:schemaRef ds:uri="http://www.w3.org/2001/XMLSchema"/>
+    <ds:schemaRef ds:uri="http://schemas.microsoft.com/office/2006/metadata/properties"/>
+    <ds:schemaRef ds:uri="http://schemas.openxmlformats.org/package/2006/metadata/core-properties"/>
+    <ds:schemaRef ds:uri="http://purl.org/dc/elements/1.1/"/>
     <ds:schemaRef ds:uri="http://purl.org/dc/terms/"/>
-    <ds:schemaRef ds:uri="http://schemas.openxmlformats.org/package/2006/metadata/core-properties"/>
-    <ds:schemaRef ds:uri="http://schemas.microsoft.com/office/2006/documentManagement/types"/>
+    <ds:schemaRef ds:uri="http://schemas.microsoft.com/internal/obd"/>
     <ds:schemaRef ds:uri="http://schemas.microsoft.com/office/infopath/2007/PartnerControls"/>
-    <ds:schemaRef ds:uri="http://purl.org/dc/elements/1.1/"/>
-    <ds:schemaRef ds:uri="http://schemas.microsoft.com/office/2006/metadata/properties"/>
-    <ds:schemaRef ds:uri="http://www.w3.org/XML/1998/namespace"/>
-    <ds:schemaRef ds:uri="http://purl.org/dc/dcmitype/"/>
   </ds:schemaRefs>
 </ds:datastoreItem>
 </file>
@@ -45795,17 +45824,16 @@
 </file>
 
 <file path=customXml/itemProps3.xml><?xml version="1.0" encoding="utf-8"?>
-<ds:datastoreItem xmlns:ds="http://schemas.openxmlformats.org/officeDocument/2006/customXml" ds:itemID="{59925F4A-05CC-4D19-A5F3-6B37E808F6A7}">
+<ds:datastoreItem xmlns:ds="http://schemas.openxmlformats.org/officeDocument/2006/customXml" ds:itemID="{88E5C257-99A9-40B2-A1DE-0EB62604DA9C}">
   <ds:schemaRefs>
-    <ds:schemaRef ds:uri="http://schemas.microsoft.com/office/2006/metadata/contentType"/>
-    <ds:schemaRef ds:uri="http://schemas.microsoft.com/office/2006/metadata/properties/metaAttributes"/>
-    <ds:schemaRef ds:uri="http://www.w3.org/2001/XMLSchema"/>
+    <ds:schemaRef ds:uri="http://purl.org/dc/terms/"/>
+    <ds:schemaRef ds:uri="http://schemas.openxmlformats.org/package/2006/metadata/core-properties"/>
+    <ds:schemaRef ds:uri="http://schemas.microsoft.com/office/2006/documentManagement/types"/>
+    <ds:schemaRef ds:uri="http://schemas.microsoft.com/office/infopath/2007/PartnerControls"/>
+    <ds:schemaRef ds:uri="http://purl.org/dc/elements/1.1/"/>
     <ds:schemaRef ds:uri="http://schemas.microsoft.com/office/2006/metadata/properties"/>
-    <ds:schemaRef ds:uri="http://schemas.openxmlformats.org/package/2006/metadata/core-properties"/>
-    <ds:schemaRef ds:uri="http://purl.org/dc/elements/1.1/"/>
-    <ds:schemaRef ds:uri="http://purl.org/dc/terms/"/>
-    <ds:schemaRef ds:uri="http://schemas.microsoft.com/internal/obd"/>
-    <ds:schemaRef ds:uri="http://schemas.microsoft.com/office/infopath/2007/PartnerControls"/>
+    <ds:schemaRef ds:uri="http://www.w3.org/XML/1998/namespace"/>
+    <ds:schemaRef ds:uri="http://purl.org/dc/dcmitype/"/>
   </ds:schemaRefs>
 </ds:datastoreItem>
 </file>
</xml_diff>

<commit_message>
[DOC]Improve doc according to the comments (#22)
</commit_message>
<xml_diff>
--- a/zigbee/EmberZnet and WSTK.pptx
+++ b/zigbee/EmberZnet and WSTK.pptx
@@ -248,7 +248,7 @@
           <a:p>
             <a:fld id="{3CAB3C29-341D-6743-A203-2F7086D57830}" type="datetimeFigureOut">
               <a:rPr lang="en-US" smtClean="0"/>
-              <a:t>2019-11-25</a:t>
+              <a:t>2019-12-08</a:t>
             </a:fld>
             <a:endParaRPr lang="en-US"/>
           </a:p>
@@ -24247,7 +24247,7 @@
           <p:nvPr>
             <p:extLst>
               <p:ext uri="{D42A27DB-BD31-4B8C-83A1-F6EECF244321}">
-                <p14:modId xmlns:p14="http://schemas.microsoft.com/office/powerpoint/2010/main" val="2691451058"/>
+                <p14:modId xmlns:p14="http://schemas.microsoft.com/office/powerpoint/2010/main" val="3056383326"/>
               </p:ext>
             </p:extLst>
           </p:nvPr>
@@ -24475,10 +24475,34 @@
                     <a:lstStyle/>
                     <a:p>
                       <a:r>
-                        <a:rPr lang="en-US" dirty="0" err="1"/>
+                        <a:rPr lang="en-US" dirty="0" err="1">
+                          <a:solidFill>
+                            <a:srgbClr val="FF0000"/>
+                          </a:solidFill>
+                        </a:rPr>
                         <a:t>znet-cli.c</a:t>
                       </a:r>
-                      <a:endParaRPr lang="en-US" dirty="0"/>
+                      <a:r>
+                        <a:rPr lang="en-US" dirty="0">
+                          <a:solidFill>
+                            <a:srgbClr val="FF0000"/>
+                          </a:solidFill>
+                        </a:rPr>
+                        <a:t>/</a:t>
+                      </a:r>
+                      <a:r>
+                        <a:rPr lang="en-US" dirty="0" err="1">
+                          <a:solidFill>
+                            <a:srgbClr val="FF0000"/>
+                          </a:solidFill>
+                        </a:rPr>
+                        <a:t>znet-cli.h</a:t>
+                      </a:r>
+                      <a:endParaRPr lang="en-US" dirty="0">
+                        <a:solidFill>
+                          <a:srgbClr val="FF0000"/>
+                        </a:solidFill>
+                      </a:endParaRPr>
                     </a:p>
                   </a:txBody>
                   <a:tcPr/>
@@ -24489,7 +24513,11 @@
                     <a:lstStyle/>
                     <a:p>
                       <a:r>
-                        <a:rPr lang="en-US" dirty="0"/>
+                        <a:rPr lang="en-US" dirty="0">
+                          <a:solidFill>
+                            <a:srgbClr val="FF0000"/>
+                          </a:solidFill>
+                        </a:rPr>
                         <a:t>CLI command list</a:t>
                       </a:r>
                     </a:p>
@@ -45643,21 +45671,6 @@
 </file>
 
 <file path=customXml/item1.xml><?xml version="1.0" encoding="utf-8"?>
-<p:properties xmlns:p="http://schemas.microsoft.com/office/2006/metadata/properties" xmlns:xsi="http://www.w3.org/2001/XMLSchema-instance" xmlns:pc="http://schemas.microsoft.com/office/infopath/2007/PartnerControls">
-  <documentManagement/>
-</p:properties>
-</file>
-
-<file path=customXml/item2.xml><?xml version="1.0" encoding="utf-8"?>
-<?mso-contentType ?>
-<FormTemplates xmlns="http://schemas.microsoft.com/sharepoint/v3/contenttype/forms">
-  <Display>DocumentLibraryForm</Display>
-  <Edit>DocumentLibraryForm</Edit>
-  <New>DocumentLibraryForm</New>
-</FormTemplates>
-</file>
-
-<file path=customXml/item3.xml><?xml version="1.0" encoding="utf-8"?>
 <ct:contentTypeSchema xmlns:ct="http://schemas.microsoft.com/office/2006/metadata/contentType" xmlns:ma="http://schemas.microsoft.com/office/2006/metadata/properties/metaAttributes" ct:_="" ma:_="" ma:contentTypeName="Document" ma:contentTypeID="0x010100B21F7AB2AB09B744870FD2BB34F58D4C" ma:contentTypeVersion="0" ma:contentTypeDescription="Create a new document." ma:contentTypeScope="" ma:versionID="610a13794e9c15d6bc8a774371eef038">
   <xsd:schema xmlns:xsd="http://www.w3.org/2001/XMLSchema" xmlns:xs="http://www.w3.org/2001/XMLSchema" xmlns:p="http://schemas.microsoft.com/office/2006/metadata/properties" targetNamespace="http://schemas.microsoft.com/office/2006/metadata/properties" ma:root="true" ma:fieldsID="1b05d82d297216baf5b26c55225140df">
     <xsd:element name="properties">
@@ -45771,17 +45784,33 @@
 </ct:contentTypeSchema>
 </file>
 
+<file path=customXml/item2.xml><?xml version="1.0" encoding="utf-8"?>
+<?mso-contentType ?>
+<FormTemplates xmlns="http://schemas.microsoft.com/sharepoint/v3/contenttype/forms">
+  <Display>DocumentLibraryForm</Display>
+  <Edit>DocumentLibraryForm</Edit>
+  <New>DocumentLibraryForm</New>
+</FormTemplates>
+</file>
+
+<file path=customXml/item3.xml><?xml version="1.0" encoding="utf-8"?>
+<p:properties xmlns:p="http://schemas.microsoft.com/office/2006/metadata/properties" xmlns:xsi="http://www.w3.org/2001/XMLSchema-instance" xmlns:pc="http://schemas.microsoft.com/office/infopath/2007/PartnerControls">
+  <documentManagement/>
+</p:properties>
+</file>
+
 <file path=customXml/itemProps1.xml><?xml version="1.0" encoding="utf-8"?>
-<ds:datastoreItem xmlns:ds="http://schemas.openxmlformats.org/officeDocument/2006/customXml" ds:itemID="{88E5C257-99A9-40B2-A1DE-0EB62604DA9C}">
+<ds:datastoreItem xmlns:ds="http://schemas.openxmlformats.org/officeDocument/2006/customXml" ds:itemID="{59925F4A-05CC-4D19-A5F3-6B37E808F6A7}">
   <ds:schemaRefs>
+    <ds:schemaRef ds:uri="http://schemas.microsoft.com/office/2006/metadata/contentType"/>
+    <ds:schemaRef ds:uri="http://schemas.microsoft.com/office/2006/metadata/properties/metaAttributes"/>
+    <ds:schemaRef ds:uri="http://www.w3.org/2001/XMLSchema"/>
+    <ds:schemaRef ds:uri="http://schemas.microsoft.com/office/2006/metadata/properties"/>
+    <ds:schemaRef ds:uri="http://schemas.openxmlformats.org/package/2006/metadata/core-properties"/>
+    <ds:schemaRef ds:uri="http://purl.org/dc/elements/1.1/"/>
     <ds:schemaRef ds:uri="http://purl.org/dc/terms/"/>
-    <ds:schemaRef ds:uri="http://schemas.openxmlformats.org/package/2006/metadata/core-properties"/>
-    <ds:schemaRef ds:uri="http://schemas.microsoft.com/office/2006/documentManagement/types"/>
+    <ds:schemaRef ds:uri="http://schemas.microsoft.com/internal/obd"/>
     <ds:schemaRef ds:uri="http://schemas.microsoft.com/office/infopath/2007/PartnerControls"/>
-    <ds:schemaRef ds:uri="http://purl.org/dc/elements/1.1/"/>
-    <ds:schemaRef ds:uri="http://schemas.microsoft.com/office/2006/metadata/properties"/>
-    <ds:schemaRef ds:uri="http://www.w3.org/XML/1998/namespace"/>
-    <ds:schemaRef ds:uri="http://purl.org/dc/dcmitype/"/>
   </ds:schemaRefs>
 </ds:datastoreItem>
 </file>
@@ -45795,17 +45824,16 @@
 </file>
 
 <file path=customXml/itemProps3.xml><?xml version="1.0" encoding="utf-8"?>
-<ds:datastoreItem xmlns:ds="http://schemas.openxmlformats.org/officeDocument/2006/customXml" ds:itemID="{59925F4A-05CC-4D19-A5F3-6B37E808F6A7}">
+<ds:datastoreItem xmlns:ds="http://schemas.openxmlformats.org/officeDocument/2006/customXml" ds:itemID="{88E5C257-99A9-40B2-A1DE-0EB62604DA9C}">
   <ds:schemaRefs>
-    <ds:schemaRef ds:uri="http://schemas.microsoft.com/office/2006/metadata/contentType"/>
-    <ds:schemaRef ds:uri="http://schemas.microsoft.com/office/2006/metadata/properties/metaAttributes"/>
-    <ds:schemaRef ds:uri="http://www.w3.org/2001/XMLSchema"/>
+    <ds:schemaRef ds:uri="http://purl.org/dc/terms/"/>
+    <ds:schemaRef ds:uri="http://schemas.openxmlformats.org/package/2006/metadata/core-properties"/>
+    <ds:schemaRef ds:uri="http://schemas.microsoft.com/office/2006/documentManagement/types"/>
+    <ds:schemaRef ds:uri="http://schemas.microsoft.com/office/infopath/2007/PartnerControls"/>
+    <ds:schemaRef ds:uri="http://purl.org/dc/elements/1.1/"/>
     <ds:schemaRef ds:uri="http://schemas.microsoft.com/office/2006/metadata/properties"/>
-    <ds:schemaRef ds:uri="http://schemas.openxmlformats.org/package/2006/metadata/core-properties"/>
-    <ds:schemaRef ds:uri="http://purl.org/dc/elements/1.1/"/>
-    <ds:schemaRef ds:uri="http://purl.org/dc/terms/"/>
-    <ds:schemaRef ds:uri="http://schemas.microsoft.com/internal/obd"/>
-    <ds:schemaRef ds:uri="http://schemas.microsoft.com/office/infopath/2007/PartnerControls"/>
+    <ds:schemaRef ds:uri="http://www.w3.org/XML/1998/namespace"/>
+    <ds:schemaRef ds:uri="http://purl.org/dc/dcmitype/"/>
   </ds:schemaRefs>
 </ds:datastoreItem>
 </file>
</xml_diff>